<commit_message>
KS Overview: Added Corepac Slides for Harris Training SW Overview: Revised order per Bhavin's comments
</commit_message>
<xml_diff>
--- a/slides/Introduction to KeyStone Software Ecosystem.pptx
+++ b/slides/Introduction to KeyStone Software Ecosystem.pptx
@@ -23,8 +23,8 @@
     <p:sldId id="268" r:id="rId14"/>
     <p:sldId id="284" r:id="rId15"/>
     <p:sldId id="269" r:id="rId16"/>
-    <p:sldId id="283" r:id="rId17"/>
-    <p:sldId id="280" r:id="rId18"/>
+    <p:sldId id="280" r:id="rId17"/>
+    <p:sldId id="307" r:id="rId18"/>
     <p:sldId id="285" r:id="rId19"/>
     <p:sldId id="304" r:id="rId20"/>
     <p:sldId id="287" r:id="rId21"/>
@@ -135,6 +135,12 @@
 </p:presentation>
 </file>
 
+<file path=ppt/commentAuthors.xml><?xml version="1.0" encoding="utf-8"?>
+<p:cmAuthorLst xmlns:a="http://schemas.openxmlformats.org/drawingml/2006/main" xmlns:r="http://schemas.openxmlformats.org/officeDocument/2006/relationships" xmlns:p="http://schemas.openxmlformats.org/presentationml/2006/main">
+  <p:cmAuthor id="0" name="a0133017" initials="a" lastIdx="4" clrIdx="0"/>
+</p:cmAuthorLst>
+</file>
+
 <file path=ppt/notesMasters/notesMaster1.xml><?xml version="1.0" encoding="utf-8"?>
 <p:notesMaster xmlns:a="http://schemas.openxmlformats.org/drawingml/2006/main" xmlns:r="http://schemas.openxmlformats.org/officeDocument/2006/relationships" xmlns:p="http://schemas.openxmlformats.org/presentationml/2006/main">
   <p:cSld>
@@ -218,7 +224,7 @@
             <a:fld id="{69317A74-A311-45B3-846C-A32F769EEF76}" type="datetimeFigureOut">
               <a:rPr lang="en-US" smtClean="0"/>
               <a:pPr/>
-              <a:t>6/14/2012</a:t>
+              <a:t>6/19/2012</a:t>
             </a:fld>
             <a:endParaRPr lang="en-US" dirty="0"/>
           </a:p>
@@ -546,7 +552,7 @@
                 <a:spcPct val="0"/>
               </a:spcBef>
             </a:pPr>
-            <a:endParaRPr lang="en-US" smtClean="0"/>
+            <a:endParaRPr lang="en-US" dirty="0" smtClean="0"/>
           </a:p>
         </p:txBody>
       </p:sp>
@@ -576,7 +582,7 @@
               <a:pPr/>
               <a:t>6</a:t>
             </a:fld>
-            <a:endParaRPr lang="en-US" smtClean="0">
+            <a:endParaRPr lang="en-US" dirty="0" smtClean="0">
               <a:solidFill>
                 <a:srgbClr val="000000"/>
               </a:solidFill>
@@ -631,7 +637,7 @@
               <a:pPr/>
               <a:t>20</a:t>
             </a:fld>
-            <a:endParaRPr lang="en-US" smtClean="0"/>
+            <a:endParaRPr lang="en-US" dirty="0" smtClean="0"/>
           </a:p>
         </p:txBody>
       </p:sp>
@@ -680,7 +686,7 @@
                 <a:spcPct val="0"/>
               </a:spcBef>
             </a:pPr>
-            <a:endParaRPr lang="en-US" smtClean="0"/>
+            <a:endParaRPr lang="en-US" dirty="0" smtClean="0"/>
           </a:p>
         </p:txBody>
       </p:sp>
@@ -815,7 +821,7 @@
                 <a:spcPct val="0"/>
               </a:spcBef>
             </a:pPr>
-            <a:endParaRPr lang="en-US" smtClean="0"/>
+            <a:endParaRPr lang="en-US" dirty="0" smtClean="0"/>
           </a:p>
         </p:txBody>
       </p:sp>
@@ -845,7 +851,7 @@
               <a:pPr/>
               <a:t>7</a:t>
             </a:fld>
-            <a:endParaRPr lang="en-US" smtClean="0">
+            <a:endParaRPr lang="en-US" dirty="0" smtClean="0">
               <a:solidFill>
                 <a:srgbClr val="000000"/>
               </a:solidFill>
@@ -923,7 +929,7 @@
                 <a:spcPct val="0"/>
               </a:spcBef>
             </a:pPr>
-            <a:endParaRPr lang="en-US" smtClean="0"/>
+            <a:endParaRPr lang="en-US" dirty="0" smtClean="0"/>
           </a:p>
         </p:txBody>
       </p:sp>
@@ -953,7 +959,7 @@
               <a:pPr/>
               <a:t>9</a:t>
             </a:fld>
-            <a:endParaRPr lang="en-US" smtClean="0">
+            <a:endParaRPr lang="en-US" dirty="0" smtClean="0">
               <a:solidFill>
                 <a:srgbClr val="000000"/>
               </a:solidFill>
@@ -1081,7 +1087,7 @@
               <a:pPr/>
               <a:t>12</a:t>
             </a:fld>
-            <a:endParaRPr lang="en-US" smtClean="0">
+            <a:endParaRPr lang="en-US" dirty="0" smtClean="0">
               <a:solidFill>
                 <a:prstClr val="black"/>
               </a:solidFill>
@@ -1134,7 +1140,7 @@
                 <a:spcPct val="0"/>
               </a:spcBef>
             </a:pPr>
-            <a:endParaRPr lang="en-US" smtClean="0"/>
+            <a:endParaRPr lang="en-US" dirty="0" smtClean="0"/>
           </a:p>
         </p:txBody>
       </p:sp>
@@ -1203,7 +1209,7 @@
           <a:bodyPr/>
           <a:lstStyle/>
           <a:p>
-            <a:endParaRPr lang="en-US" smtClean="0"/>
+            <a:endParaRPr lang="en-US" dirty="0" smtClean="0"/>
           </a:p>
         </p:txBody>
       </p:sp>
@@ -1258,7 +1264,7 @@
               <a:pPr/>
               <a:t>16</a:t>
             </a:fld>
-            <a:endParaRPr lang="en-US" smtClean="0">
+            <a:endParaRPr lang="en-US" dirty="0" smtClean="0">
               <a:solidFill>
                 <a:prstClr val="black"/>
               </a:solidFill>
@@ -1385,7 +1391,7 @@
                 <a:spcPct val="0"/>
               </a:spcBef>
             </a:pPr>
-            <a:endParaRPr lang="en-US" smtClean="0"/>
+            <a:endParaRPr lang="en-US" dirty="0" smtClean="0"/>
           </a:p>
         </p:txBody>
       </p:sp>
@@ -1415,7 +1421,7 @@
               <a:pPr/>
               <a:t>17</a:t>
             </a:fld>
-            <a:endParaRPr lang="en-US" smtClean="0">
+            <a:endParaRPr lang="en-US" dirty="0" smtClean="0">
               <a:solidFill>
                 <a:srgbClr val="000000"/>
               </a:solidFill>
@@ -1493,7 +1499,7 @@
                 <a:spcPct val="0"/>
               </a:spcBef>
             </a:pPr>
-            <a:endParaRPr lang="en-US" smtClean="0"/>
+            <a:endParaRPr lang="en-US" dirty="0" smtClean="0"/>
           </a:p>
         </p:txBody>
       </p:sp>
@@ -1523,7 +1529,7 @@
               <a:pPr/>
               <a:t>19</a:t>
             </a:fld>
-            <a:endParaRPr lang="en-US" smtClean="0">
+            <a:endParaRPr lang="en-US" dirty="0" smtClean="0">
               <a:solidFill>
                 <a:srgbClr val="000000"/>
               </a:solidFill>
@@ -1540,54 +1546,6 @@
 </file>
 
 <file path=ppt/slideLayouts/slideLayout1.xml><?xml version="1.0" encoding="utf-8"?>
-<p:sldLayout xmlns:a="http://schemas.openxmlformats.org/drawingml/2006/main" xmlns:r="http://schemas.openxmlformats.org/officeDocument/2006/relationships" xmlns:p="http://schemas.openxmlformats.org/presentationml/2006/main" type="titleOnly">
-  <p:cSld name="Title Only Large Graphic">
-    <p:spTree>
-      <p:nvGrpSpPr>
-        <p:cNvPr id="1" name=""/>
-        <p:cNvGrpSpPr/>
-        <p:nvPr/>
-      </p:nvGrpSpPr>
-      <p:grpSpPr>
-        <a:xfrm>
-          <a:off x="0" y="0"/>
-          <a:ext cx="0" cy="0"/>
-          <a:chOff x="0" y="0"/>
-          <a:chExt cx="0" cy="0"/>
-        </a:xfrm>
-      </p:grpSpPr>
-      <p:sp>
-        <p:nvSpPr>
-          <p:cNvPr id="2" name="Title 1"/>
-          <p:cNvSpPr>
-            <a:spLocks noGrp="1"/>
-          </p:cNvSpPr>
-          <p:nvPr>
-            <p:ph type="title"/>
-          </p:nvPr>
-        </p:nvSpPr>
-        <p:spPr/>
-        <p:txBody>
-          <a:bodyPr/>
-          <a:lstStyle/>
-          <a:p>
-            <a:r>
-              <a:rPr lang="en-US" smtClean="0"/>
-              <a:t>Click to edit Master title style</a:t>
-            </a:r>
-            <a:endParaRPr lang="en-US"/>
-          </a:p>
-        </p:txBody>
-      </p:sp>
-    </p:spTree>
-  </p:cSld>
-  <p:clrMapOvr>
-    <a:masterClrMapping/>
-  </p:clrMapOvr>
-</p:sldLayout>
-</file>
-
-<file path=ppt/slideLayouts/slideLayout2.xml><?xml version="1.0" encoding="utf-8"?>
 <p:sldLayout xmlns:a="http://schemas.openxmlformats.org/drawingml/2006/main" xmlns:r="http://schemas.openxmlformats.org/officeDocument/2006/relationships" xmlns:p="http://schemas.openxmlformats.org/presentationml/2006/main" type="title">
   <p:cSld name="Title Slide">
     <p:spTree>
@@ -1831,7 +1789,7 @@
 </p:sldLayout>
 </file>
 
-<file path=ppt/slideLayouts/slideLayout3.xml><?xml version="1.0" encoding="utf-8"?>
+<file path=ppt/slideLayouts/slideLayout2.xml><?xml version="1.0" encoding="utf-8"?>
 <p:sldLayout xmlns:a="http://schemas.openxmlformats.org/drawingml/2006/main" xmlns:r="http://schemas.openxmlformats.org/officeDocument/2006/relationships" xmlns:p="http://schemas.openxmlformats.org/presentationml/2006/main" type="obj">
   <p:cSld name="Title and Content">
     <p:spTree>
@@ -1994,7 +1952,7 @@
 </p:sldLayout>
 </file>
 
-<file path=ppt/slideLayouts/slideLayout4.xml><?xml version="1.0" encoding="utf-8"?>
+<file path=ppt/slideLayouts/slideLayout3.xml><?xml version="1.0" encoding="utf-8"?>
 <p:sldLayout xmlns:a="http://schemas.openxmlformats.org/drawingml/2006/main" xmlns:r="http://schemas.openxmlformats.org/officeDocument/2006/relationships" xmlns:p="http://schemas.openxmlformats.org/presentationml/2006/main" type="blank">
   <p:cSld name="Blank">
     <p:spTree>
@@ -2082,6 +2040,111 @@
 </p:sldLayout>
 </file>
 
+<file path=ppt/slideLayouts/slideLayout4.xml><?xml version="1.0" encoding="utf-8"?>
+<p:sldLayout xmlns:a="http://schemas.openxmlformats.org/drawingml/2006/main" xmlns:r="http://schemas.openxmlformats.org/officeDocument/2006/relationships" xmlns:p="http://schemas.openxmlformats.org/presentationml/2006/main" type="obj">
+  <p:cSld name="Title and Content">
+    <p:spTree>
+      <p:nvGrpSpPr>
+        <p:cNvPr id="1" name=""/>
+        <p:cNvGrpSpPr/>
+        <p:nvPr/>
+      </p:nvGrpSpPr>
+      <p:grpSpPr>
+        <a:xfrm>
+          <a:off x="0" y="0"/>
+          <a:ext cx="0" cy="0"/>
+          <a:chOff x="0" y="0"/>
+          <a:chExt cx="0" cy="0"/>
+        </a:xfrm>
+      </p:grpSpPr>
+      <p:sp>
+        <p:nvSpPr>
+          <p:cNvPr id="2" name="Title 1"/>
+          <p:cNvSpPr>
+            <a:spLocks noGrp="1"/>
+          </p:cNvSpPr>
+          <p:nvPr>
+            <p:ph type="title"/>
+          </p:nvPr>
+        </p:nvSpPr>
+        <p:spPr/>
+        <p:txBody>
+          <a:bodyPr/>
+          <a:lstStyle/>
+          <a:p>
+            <a:r>
+              <a:rPr lang="en-US" smtClean="0"/>
+              <a:t>Click to edit Master title style</a:t>
+            </a:r>
+            <a:endParaRPr lang="en-US"/>
+          </a:p>
+        </p:txBody>
+      </p:sp>
+      <p:sp>
+        <p:nvSpPr>
+          <p:cNvPr id="3" name="Content Placeholder 2"/>
+          <p:cNvSpPr>
+            <a:spLocks noGrp="1"/>
+          </p:cNvSpPr>
+          <p:nvPr>
+            <p:ph idx="1"/>
+          </p:nvPr>
+        </p:nvSpPr>
+        <p:spPr>
+          <a:xfrm>
+            <a:off x="457200" y="990600"/>
+            <a:ext cx="8229600" cy="5334000"/>
+          </a:xfrm>
+        </p:spPr>
+        <p:txBody>
+          <a:bodyPr/>
+          <a:lstStyle/>
+          <a:p>
+            <a:pPr lvl="0"/>
+            <a:r>
+              <a:rPr lang="en-US" smtClean="0"/>
+              <a:t>Click to edit Master text styles</a:t>
+            </a:r>
+          </a:p>
+          <a:p>
+            <a:pPr lvl="1"/>
+            <a:r>
+              <a:rPr lang="en-US" smtClean="0"/>
+              <a:t>Second level</a:t>
+            </a:r>
+          </a:p>
+          <a:p>
+            <a:pPr lvl="2"/>
+            <a:r>
+              <a:rPr lang="en-US" smtClean="0"/>
+              <a:t>Third level</a:t>
+            </a:r>
+          </a:p>
+          <a:p>
+            <a:pPr lvl="3"/>
+            <a:r>
+              <a:rPr lang="en-US" smtClean="0"/>
+              <a:t>Fourth level</a:t>
+            </a:r>
+          </a:p>
+          <a:p>
+            <a:pPr lvl="4"/>
+            <a:r>
+              <a:rPr lang="en-US" smtClean="0"/>
+              <a:t>Fifth level</a:t>
+            </a:r>
+            <a:endParaRPr lang="en-US"/>
+          </a:p>
+        </p:txBody>
+      </p:sp>
+    </p:spTree>
+  </p:cSld>
+  <p:clrMapOvr>
+    <a:masterClrMapping/>
+  </p:clrMapOvr>
+</p:sldLayout>
+</file>
+
 <file path=ppt/slideLayouts/slideLayout5.xml><?xml version="1.0" encoding="utf-8"?>
 <p:sldLayout xmlns:a="http://schemas.openxmlformats.org/drawingml/2006/main" xmlns:r="http://schemas.openxmlformats.org/officeDocument/2006/relationships" xmlns:p="http://schemas.openxmlformats.org/presentationml/2006/main" type="obj">
   <p:cSld name="Title and Content">
@@ -2188,8 +2251,8 @@
 </file>
 
 <file path=ppt/slideLayouts/slideLayout6.xml><?xml version="1.0" encoding="utf-8"?>
-<p:sldLayout xmlns:a="http://schemas.openxmlformats.org/drawingml/2006/main" xmlns:r="http://schemas.openxmlformats.org/officeDocument/2006/relationships" xmlns:p="http://schemas.openxmlformats.org/presentationml/2006/main" type="obj">
-  <p:cSld name="Title and Content">
+<p:sldLayout xmlns:a="http://schemas.openxmlformats.org/drawingml/2006/main" xmlns:r="http://schemas.openxmlformats.org/officeDocument/2006/relationships" xmlns:p="http://schemas.openxmlformats.org/presentationml/2006/main" type="titleOnly">
+  <p:cSld name="Title Only Large Graphic">
     <p:spTree>
       <p:nvGrpSpPr>
         <p:cNvPr id="1" name=""/>
@@ -2222,63 +2285,6 @@
             <a:r>
               <a:rPr lang="en-US" smtClean="0"/>
               <a:t>Click to edit Master title style</a:t>
-            </a:r>
-            <a:endParaRPr lang="en-US"/>
-          </a:p>
-        </p:txBody>
-      </p:sp>
-      <p:sp>
-        <p:nvSpPr>
-          <p:cNvPr id="3" name="Content Placeholder 2"/>
-          <p:cNvSpPr>
-            <a:spLocks noGrp="1"/>
-          </p:cNvSpPr>
-          <p:nvPr>
-            <p:ph idx="1"/>
-          </p:nvPr>
-        </p:nvSpPr>
-        <p:spPr>
-          <a:xfrm>
-            <a:off x="457200" y="990600"/>
-            <a:ext cx="8229600" cy="5334000"/>
-          </a:xfrm>
-        </p:spPr>
-        <p:txBody>
-          <a:bodyPr/>
-          <a:lstStyle/>
-          <a:p>
-            <a:pPr lvl="0"/>
-            <a:r>
-              <a:rPr lang="en-US" smtClean="0"/>
-              <a:t>Click to edit Master text styles</a:t>
-            </a:r>
-          </a:p>
-          <a:p>
-            <a:pPr lvl="1"/>
-            <a:r>
-              <a:rPr lang="en-US" smtClean="0"/>
-              <a:t>Second level</a:t>
-            </a:r>
-          </a:p>
-          <a:p>
-            <a:pPr lvl="2"/>
-            <a:r>
-              <a:rPr lang="en-US" smtClean="0"/>
-              <a:t>Third level</a:t>
-            </a:r>
-          </a:p>
-          <a:p>
-            <a:pPr lvl="3"/>
-            <a:r>
-              <a:rPr lang="en-US" smtClean="0"/>
-              <a:t>Fourth level</a:t>
-            </a:r>
-          </a:p>
-          <a:p>
-            <a:pPr lvl="4"/>
-            <a:r>
-              <a:rPr lang="en-US" smtClean="0"/>
-              <a:t>Fifth level</a:t>
             </a:r>
             <a:endParaRPr lang="en-US"/>
           </a:p>
@@ -2460,7 +2466,7 @@
             <a:pPr>
               <a:defRPr/>
             </a:pPr>
-            <a:endParaRPr lang="en-US">
+            <a:endParaRPr lang="en-US" dirty="0">
               <a:solidFill>
                 <a:prstClr val="black"/>
               </a:solidFill>
@@ -2477,12 +2483,12 @@
           </p:cNvPicPr>
           <p:nvPr userDrawn="1">
             <p:custDataLst>
-              <p:tags r:id="rId6"/>
+              <p:tags r:id="rId5"/>
             </p:custDataLst>
           </p:nvPr>
         </p:nvPicPr>
         <p:blipFill>
-          <a:blip r:embed="rId8" cstate="print"/>
+          <a:blip r:embed="rId7" cstate="print"/>
           <a:srcRect/>
           <a:stretch>
             <a:fillRect/>
@@ -2511,7 +2517,7 @@
           <p:cNvSpPr/>
           <p:nvPr userDrawn="1">
             <p:custDataLst>
-              <p:tags r:id="rId7"/>
+              <p:tags r:id="rId6"/>
             </p:custDataLst>
           </p:nvPr>
         </p:nvSpPr>
@@ -2581,10 +2587,9 @@
   </p:cSld>
   <p:clrMap bg1="lt1" tx1="dk1" bg2="lt2" tx2="dk2" accent1="accent1" accent2="accent2" accent3="accent3" accent4="accent4" accent5="accent5" accent6="accent6" hlink="hlink" folHlink="folHlink"/>
   <p:sldLayoutIdLst>
-    <p:sldLayoutId id="2147483666" r:id="rId1"/>
-    <p:sldLayoutId id="2147483676" r:id="rId2"/>
-    <p:sldLayoutId id="2147483677" r:id="rId3"/>
-    <p:sldLayoutId id="2147483678" r:id="rId4"/>
+    <p:sldLayoutId id="2147483676" r:id="rId1"/>
+    <p:sldLayoutId id="2147483677" r:id="rId2"/>
+    <p:sldLayoutId id="2147483678" r:id="rId3"/>
   </p:sldLayoutIdLst>
   <p:txStyles>
     <p:titleStyle>
@@ -3136,7 +3141,7 @@
             <a:pPr>
               <a:defRPr/>
             </a:pPr>
-            <a:endParaRPr lang="en-US">
+            <a:endParaRPr lang="en-US" dirty="0">
               <a:solidFill>
                 <a:prstClr val="black"/>
               </a:solidFill>
@@ -3809,7 +3814,7 @@
             <a:pPr>
               <a:defRPr/>
             </a:pPr>
-            <a:endParaRPr lang="en-US">
+            <a:endParaRPr lang="en-US" dirty="0">
               <a:solidFill>
                 <a:prstClr val="black"/>
               </a:solidFill>
@@ -3826,12 +3831,12 @@
           </p:cNvPicPr>
           <p:nvPr userDrawn="1">
             <p:custDataLst>
-              <p:tags r:id="rId3"/>
+              <p:tags r:id="rId4"/>
             </p:custDataLst>
           </p:nvPr>
         </p:nvPicPr>
         <p:blipFill>
-          <a:blip r:embed="rId5" cstate="print"/>
+          <a:blip r:embed="rId6" cstate="print"/>
           <a:srcRect/>
           <a:stretch>
             <a:fillRect/>
@@ -3860,7 +3865,7 @@
           <p:cNvSpPr/>
           <p:nvPr userDrawn="1">
             <p:custDataLst>
-              <p:tags r:id="rId4"/>
+              <p:tags r:id="rId5"/>
             </p:custDataLst>
           </p:nvPr>
         </p:nvSpPr>
@@ -3931,6 +3936,7 @@
   <p:clrMap bg1="lt1" tx1="dk1" bg2="lt2" tx2="dk2" accent1="accent1" accent2="accent2" accent3="accent3" accent4="accent4" accent5="accent5" accent6="accent6" hlink="hlink" folHlink="folHlink"/>
   <p:sldLayoutIdLst>
     <p:sldLayoutId id="2147483670" r:id="rId1"/>
+    <p:sldLayoutId id="2147483679" r:id="rId2"/>
   </p:sldLayoutIdLst>
   <p:txStyles>
     <p:titleStyle>
@@ -4343,13 +4349,13 @@
         </p:nvSpPr>
         <p:spPr>
           <a:xfrm>
-            <a:off x="685800" y="1143001"/>
-            <a:ext cx="7772400" cy="1295400"/>
+            <a:off x="685800" y="1143000"/>
+            <a:ext cx="7772400" cy="3200400"/>
           </a:xfrm>
         </p:spPr>
         <p:txBody>
           <a:bodyPr>
-            <a:normAutofit fontScale="90000"/>
+            <a:normAutofit/>
           </a:bodyPr>
           <a:lstStyle/>
           <a:p>
@@ -4361,26 +4367,26 @@
               <a:rPr lang="en-US" sz="3200" b="0" dirty="0" smtClean="0"/>
             </a:br>
             <a:r>
-              <a:rPr lang="en-US" sz="3200" b="0" dirty="0" smtClean="0">
+              <a:rPr lang="en-US" sz="5300" b="0" dirty="0" smtClean="0">
                 <a:latin typeface="Calibri" pitchFamily="34" charset="0"/>
                 <a:cs typeface="Calibri" pitchFamily="34" charset="0"/>
               </a:rPr>
               <a:t>KeyStone Multicore</a:t>
             </a:r>
             <a:br>
-              <a:rPr lang="en-US" sz="3200" b="0" dirty="0" smtClean="0">
+              <a:rPr lang="en-US" sz="5300" b="0" dirty="0" smtClean="0">
                 <a:latin typeface="Calibri" pitchFamily="34" charset="0"/>
                 <a:cs typeface="Calibri" pitchFamily="34" charset="0"/>
               </a:rPr>
             </a:br>
             <a:r>
-              <a:rPr lang="en-US" sz="3200" b="0" dirty="0" smtClean="0">
+              <a:rPr lang="en-US" sz="5300" b="0" dirty="0" smtClean="0">
                 <a:latin typeface="Calibri" pitchFamily="34" charset="0"/>
                 <a:cs typeface="Calibri" pitchFamily="34" charset="0"/>
               </a:rPr>
               <a:t>Software Development Ecosystem</a:t>
             </a:r>
-            <a:endParaRPr lang="en-US" sz="3200" b="0" dirty="0">
+            <a:endParaRPr lang="en-US" sz="5300" b="0" dirty="0">
               <a:latin typeface="Calibri" pitchFamily="34" charset="0"/>
               <a:cs typeface="Calibri" pitchFamily="34" charset="0"/>
             </a:endParaRPr>
@@ -4431,8 +4437,8 @@
         </p:nvSpPr>
         <p:spPr>
           <a:xfrm>
-            <a:off x="457200" y="274638"/>
-            <a:ext cx="8229600" cy="563562"/>
+            <a:off x="152400" y="274638"/>
+            <a:ext cx="8839200" cy="563562"/>
           </a:xfrm>
         </p:spPr>
         <p:txBody>
@@ -4442,12 +4448,8 @@
           <a:lstStyle/>
           <a:p>
             <a:r>
-              <a:rPr lang="en-US" sz="3600" smtClean="0"/>
-              <a:t>Multicore Development </a:t>
-            </a:r>
-            <a:r>
               <a:rPr lang="en-US" sz="3600" dirty="0" smtClean="0"/>
-              <a:t>Requirements</a:t>
+              <a:t>MCSDK Overview</a:t>
             </a:r>
             <a:endParaRPr lang="en-US" sz="3600" dirty="0"/>
           </a:p>
@@ -4465,19 +4467,19 @@
         </p:nvSpPr>
         <p:spPr>
           <a:xfrm>
-            <a:off x="457200" y="990600"/>
-            <a:ext cx="8229600" cy="5334000"/>
+            <a:off x="457200" y="1219200"/>
+            <a:ext cx="8229600" cy="5105400"/>
           </a:xfrm>
         </p:spPr>
         <p:txBody>
           <a:bodyPr>
-            <a:normAutofit lnSpcReduction="10000"/>
+            <a:normAutofit/>
           </a:bodyPr>
           <a:lstStyle/>
           <a:p>
             <a:r>
               <a:rPr lang="en-US" sz="2400" dirty="0" smtClean="0"/>
-              <a:t>Standard set of APIs to configure and utilize peripherals, accelerators and other hardware resources</a:t>
+              <a:t>Standard set of APIs to configure and utilize peripherals, accelerators, and other hardware resources</a:t>
             </a:r>
           </a:p>
           <a:p>
@@ -4509,33 +4511,6 @@
               <a:rPr lang="en-US" sz="2400" dirty="0" smtClean="0"/>
               <a:t>Optimized, ready-to-use algorithm libraries, example code, and demonstration applications</a:t>
             </a:r>
-          </a:p>
-          <a:p>
-            <a:pPr algn="ctr">
-              <a:buNone/>
-            </a:pPr>
-            <a:r>
-              <a:rPr lang="en-US" sz="2800" b="1" dirty="0" smtClean="0">
-                <a:solidFill>
-                  <a:srgbClr val="FF0000"/>
-                </a:solidFill>
-              </a:rPr>
-              <a:t>TI’s solution: </a:t>
-            </a:r>
-          </a:p>
-          <a:p>
-            <a:pPr algn="ctr">
-              <a:buNone/>
-            </a:pPr>
-            <a:r>
-              <a:rPr lang="en-US" sz="2800" b="1" dirty="0" smtClean="0">
-                <a:solidFill>
-                  <a:srgbClr val="FF0000"/>
-                </a:solidFill>
-              </a:rPr>
-              <a:t>The multi-layered software system known as MCSDK.</a:t>
-            </a:r>
-            <a:endParaRPr lang="en-US" sz="2400" dirty="0"/>
           </a:p>
         </p:txBody>
       </p:sp>
@@ -4592,8 +4567,8 @@
           <a:lstStyle/>
           <a:p>
             <a:r>
-              <a:rPr lang="en-US" dirty="0" smtClean="0"/>
-              <a:t>What is MCSDK?</a:t>
+              <a:rPr lang="en-US" sz="3600" dirty="0" smtClean="0"/>
+              <a:t>MCSDK Advantages</a:t>
             </a:r>
           </a:p>
         </p:txBody>
@@ -4620,15 +4595,6 @@
           </a:bodyPr>
           <a:lstStyle/>
           <a:p>
-            <a:pPr>
-              <a:buNone/>
-            </a:pPr>
-            <a:r>
-              <a:rPr lang="en-US" sz="2400" dirty="0" smtClean="0"/>
-              <a:t>TI’s Multicore Software Development Kit (MCSDK):</a:t>
-            </a:r>
-          </a:p>
-          <a:p>
             <a:r>
               <a:rPr lang="en-US" sz="2400" dirty="0" smtClean="0"/>
               <a:t>Provides the core foundational building blocks for customers to quickly start developing embedded applications on TI high-performance multicore DSPs:</a:t>
@@ -4685,7 +4651,19 @@
           <a:p>
             <a:r>
               <a:rPr lang="en-US" sz="2400" dirty="0" smtClean="0"/>
-              <a:t>Available as a free download on TI.com, bundled in one installer as source code along with pre-built libraries</a:t>
+              <a:t>Available as a </a:t>
+            </a:r>
+            <a:r>
+              <a:rPr lang="en-US" sz="2400" dirty="0" smtClean="0">
+                <a:solidFill>
+                  <a:srgbClr val="FF0000"/>
+                </a:solidFill>
+              </a:rPr>
+              <a:t>free download </a:t>
+            </a:r>
+            <a:r>
+              <a:rPr lang="en-US" sz="2400" dirty="0" smtClean="0"/>
+              <a:t>on TI.com, bundled in one installer as source code along with pre-built libraries</a:t>
             </a:r>
           </a:p>
         </p:txBody>
@@ -4742,7 +4720,7 @@
           <a:p>
             <a:pPr eaLnBrk="1" hangingPunct="1"/>
             <a:r>
-              <a:rPr lang="en-US" sz="3600" b="1" dirty="0" smtClean="0"/>
+              <a:rPr lang="en-US" sz="3600" dirty="0" smtClean="0"/>
               <a:t>BIOS-MCSDK Software Layers</a:t>
             </a:r>
           </a:p>
@@ -4861,7 +4839,7 @@
                 </a:spcAft>
               </a:pPr>
               <a:r>
-                <a:rPr lang="en-US" sz="1200">
+                <a:rPr lang="en-US" sz="1200" dirty="0">
                   <a:solidFill>
                     <a:prstClr val="black"/>
                   </a:solidFill>
@@ -4881,7 +4859,7 @@
                 </a:spcAft>
               </a:pPr>
               <a:r>
-                <a:rPr lang="en-US" sz="1200">
+                <a:rPr lang="en-US" sz="1200" dirty="0">
                   <a:solidFill>
                     <a:prstClr val="black"/>
                   </a:solidFill>
@@ -5280,7 +5258,7 @@
                   </a:spcAft>
                 </a:pPr>
                 <a:r>
-                  <a:rPr lang="en-US" sz="1200">
+                  <a:rPr lang="en-US" sz="1200" dirty="0">
                     <a:solidFill>
                       <a:prstClr val="black"/>
                     </a:solidFill>
@@ -5300,7 +5278,7 @@
                   </a:spcAft>
                 </a:pPr>
                 <a:r>
-                  <a:rPr lang="en-US" sz="1200">
+                  <a:rPr lang="en-US" sz="1200" dirty="0">
                     <a:solidFill>
                       <a:prstClr val="black"/>
                     </a:solidFill>
@@ -5320,7 +5298,7 @@
                   </a:spcAft>
                 </a:pPr>
                 <a:r>
-                  <a:rPr lang="en-US" sz="1200">
+                  <a:rPr lang="en-US" sz="1200" dirty="0">
                     <a:solidFill>
                       <a:prstClr val="black"/>
                     </a:solidFill>
@@ -7219,12 +7197,8 @@
           <a:lstStyle/>
           <a:p>
             <a:r>
-              <a:rPr lang="en-US" dirty="0" smtClean="0"/>
-              <a:t>Developer</a:t>
-            </a:r>
-            <a:r>
               <a:rPr lang="en-US" sz="3600" dirty="0" smtClean="0"/>
-              <a:t> Challenges &gt; MCSDK Solutions</a:t>
+              <a:t>Development Requirements &gt; MCSDK Solutions</a:t>
             </a:r>
             <a:endParaRPr lang="en-US" sz="3600" dirty="0"/>
           </a:p>
@@ -7410,15 +7384,7 @@
                       </a:r>
                       <a:r>
                         <a:rPr lang="en-US" sz="1200" dirty="0" smtClean="0"/>
-                        <a:t>utilities such as </a:t>
-                      </a:r>
-                      <a:r>
-                        <a:rPr lang="en-US" sz="1200" dirty="0" err="1" smtClean="0"/>
-                        <a:t>bootloader</a:t>
-                      </a:r>
-                      <a:r>
-                        <a:rPr lang="en-US" sz="1200" dirty="0" smtClean="0"/>
-                        <a:t>, Power</a:t>
+                        <a:t>utilities such as bootloader, Power</a:t>
                       </a:r>
                       <a:r>
                         <a:rPr lang="en-US" sz="1200" baseline="0" dirty="0" smtClean="0"/>
@@ -7640,6 +7606,217 @@
 </file>
 
 <file path=ppt/slides/slide14.xml><?xml version="1.0" encoding="utf-8"?>
+<p:sld xmlns:a="http://schemas.openxmlformats.org/drawingml/2006/main" xmlns:r="http://schemas.openxmlformats.org/officeDocument/2006/relationships" xmlns:p="http://schemas.openxmlformats.org/presentationml/2006/main">
+  <p:cSld>
+    <p:spTree>
+      <p:nvGrpSpPr>
+        <p:cNvPr id="1" name=""/>
+        <p:cNvGrpSpPr/>
+        <p:nvPr/>
+      </p:nvGrpSpPr>
+      <p:grpSpPr>
+        <a:xfrm>
+          <a:off x="0" y="0"/>
+          <a:ext cx="0" cy="0"/>
+          <a:chOff x="0" y="0"/>
+          <a:chExt cx="0" cy="0"/>
+        </a:xfrm>
+      </p:grpSpPr>
+      <p:sp>
+        <p:nvSpPr>
+          <p:cNvPr id="9218" name="Title 1"/>
+          <p:cNvSpPr>
+            <a:spLocks noGrp="1"/>
+          </p:cNvSpPr>
+          <p:nvPr>
+            <p:ph type="title"/>
+          </p:nvPr>
+        </p:nvSpPr>
+        <p:spPr>
+          <a:xfrm>
+            <a:off x="457200" y="0"/>
+            <a:ext cx="8229600" cy="715962"/>
+          </a:xfrm>
+        </p:spPr>
+        <p:txBody>
+          <a:bodyPr/>
+          <a:lstStyle/>
+          <a:p>
+            <a:pPr eaLnBrk="1" hangingPunct="1"/>
+            <a:r>
+              <a:rPr lang="en-US" sz="3600" dirty="0" smtClean="0"/>
+              <a:t>MCSDK Algorithm Libraries</a:t>
+            </a:r>
+          </a:p>
+        </p:txBody>
+      </p:sp>
+      <p:sp>
+        <p:nvSpPr>
+          <p:cNvPr id="9219" name="Content Placeholder 2"/>
+          <p:cNvSpPr>
+            <a:spLocks noGrp="1"/>
+          </p:cNvSpPr>
+          <p:nvPr>
+            <p:ph idx="1"/>
+          </p:nvPr>
+        </p:nvSpPr>
+        <p:spPr>
+          <a:xfrm>
+            <a:off x="457200" y="685800"/>
+            <a:ext cx="8229600" cy="5867400"/>
+          </a:xfrm>
+        </p:spPr>
+        <p:txBody>
+          <a:bodyPr/>
+          <a:lstStyle/>
+          <a:p>
+            <a:pPr marL="0" indent="0" eaLnBrk="1" hangingPunct="1">
+              <a:buNone/>
+            </a:pPr>
+            <a:r>
+              <a:rPr lang="en-US" sz="2000" dirty="0" smtClean="0"/>
+              <a:t>Algorithm libraries contain C66x C-callable, hand-coded, assembly-optimized functions for specific usage:</a:t>
+            </a:r>
+          </a:p>
+          <a:p>
+            <a:pPr eaLnBrk="1" hangingPunct="1"/>
+            <a:r>
+              <a:rPr lang="en-US" sz="1800" b="1" dirty="0" smtClean="0"/>
+              <a:t>DSPLIB</a:t>
+            </a:r>
+            <a:r>
+              <a:rPr lang="en-US" sz="1800" dirty="0" smtClean="0"/>
+              <a:t> provides signal-processing math and vector functions:</a:t>
+            </a:r>
+          </a:p>
+          <a:p>
+            <a:pPr lvl="1" eaLnBrk="1" hangingPunct="1"/>
+            <a:r>
+              <a:rPr lang="en-US" sz="1600" dirty="0" smtClean="0"/>
+              <a:t>Adaptive filtering</a:t>
+            </a:r>
+          </a:p>
+          <a:p>
+            <a:pPr lvl="1" eaLnBrk="1" hangingPunct="1"/>
+            <a:r>
+              <a:rPr lang="en-US" sz="1600" dirty="0" smtClean="0"/>
+              <a:t>Correlation</a:t>
+            </a:r>
+          </a:p>
+          <a:p>
+            <a:pPr lvl="1" eaLnBrk="1" hangingPunct="1"/>
+            <a:r>
+              <a:rPr lang="en-US" sz="1600" dirty="0" smtClean="0"/>
+              <a:t>FFT (e.g. FFT functions for ‘npoint’ FFTs)</a:t>
+            </a:r>
+          </a:p>
+          <a:p>
+            <a:pPr lvl="1" eaLnBrk="1" hangingPunct="1"/>
+            <a:r>
+              <a:rPr lang="en-US" sz="1600" dirty="0" smtClean="0"/>
+              <a:t>Filtering and Convolution (e.g., FIR, IIR filter functions, etc.)</a:t>
+            </a:r>
+          </a:p>
+          <a:p>
+            <a:pPr lvl="1" eaLnBrk="1" hangingPunct="1"/>
+            <a:r>
+              <a:rPr lang="en-US" sz="1600" dirty="0" smtClean="0"/>
+              <a:t>Matrix (e.g., single and double precision matrix multiplication, etc.)</a:t>
+            </a:r>
+          </a:p>
+          <a:p>
+            <a:pPr eaLnBrk="1" hangingPunct="1"/>
+            <a:r>
+              <a:rPr lang="en-US" sz="1800" b="1" dirty="0" smtClean="0"/>
+              <a:t>IMGLIB</a:t>
+            </a:r>
+            <a:r>
+              <a:rPr lang="en-US" sz="1800" dirty="0" smtClean="0"/>
+              <a:t> provides image/video processing functions:</a:t>
+            </a:r>
+          </a:p>
+          <a:p>
+            <a:pPr lvl="1" eaLnBrk="1" hangingPunct="1"/>
+            <a:r>
+              <a:rPr lang="en-US" sz="1600" dirty="0" smtClean="0"/>
+              <a:t>Compression &amp; Decompression (e.g., forward and inverse DCT, motion estimation, quantization, etc.)</a:t>
+            </a:r>
+          </a:p>
+          <a:p>
+            <a:pPr lvl="1" eaLnBrk="1" hangingPunct="1"/>
+            <a:r>
+              <a:rPr lang="en-US" sz="1600" dirty="0" smtClean="0"/>
+              <a:t>Image Analysis (e.g., edge detection, histogram, thresholding, etc.)</a:t>
+            </a:r>
+          </a:p>
+          <a:p>
+            <a:pPr lvl="1" eaLnBrk="1" hangingPunct="1"/>
+            <a:r>
+              <a:rPr lang="en-US" sz="1600" dirty="0" smtClean="0"/>
+              <a:t>Image Filtering and Conversion (e.g., color space conversion, convolution, correlation,  error diffusion, etc.)</a:t>
+            </a:r>
+          </a:p>
+          <a:p>
+            <a:pPr eaLnBrk="1" hangingPunct="1"/>
+            <a:r>
+              <a:rPr lang="en-US" sz="1800" b="1" dirty="0" smtClean="0"/>
+              <a:t>MathLIB</a:t>
+            </a:r>
+            <a:r>
+              <a:rPr lang="en-US" sz="1800" dirty="0" smtClean="0"/>
+              <a:t> provides floating-point math functions:</a:t>
+            </a:r>
+          </a:p>
+          <a:p>
+            <a:pPr lvl="1" eaLnBrk="1" hangingPunct="1"/>
+            <a:r>
+              <a:rPr lang="en-US" sz="1600" dirty="0" smtClean="0"/>
+              <a:t>Single-precision (e.g., cosine/sine/tangent of a floating point number, etc.)</a:t>
+            </a:r>
+          </a:p>
+          <a:p>
+            <a:pPr lvl="1" eaLnBrk="1" hangingPunct="1"/>
+            <a:r>
+              <a:rPr lang="en-US" sz="1600" dirty="0" smtClean="0"/>
+              <a:t>Double precision (e.g., similar functions as above with argument type and return values to be of type double)</a:t>
+            </a:r>
+          </a:p>
+          <a:p>
+            <a:pPr eaLnBrk="1" hangingPunct="1"/>
+            <a:r>
+              <a:rPr lang="en-US" sz="2000" dirty="0" smtClean="0"/>
+              <a:t>More info: </a:t>
+            </a:r>
+            <a:r>
+              <a:rPr lang="en-US" sz="2000" dirty="0" smtClean="0">
+                <a:hlinkClick r:id="rId2"/>
+              </a:rPr>
+              <a:t>http://processors.wiki.ti.com/index.php/Software_libraries</a:t>
+            </a:r>
+            <a:endParaRPr lang="en-US" sz="2000" dirty="0" smtClean="0"/>
+          </a:p>
+          <a:p>
+            <a:pPr eaLnBrk="1" hangingPunct="1"/>
+            <a:endParaRPr lang="en-US" sz="2000" dirty="0" smtClean="0"/>
+          </a:p>
+        </p:txBody>
+      </p:sp>
+    </p:spTree>
+  </p:cSld>
+  <p:clrMapOvr>
+    <a:masterClrMapping/>
+  </p:clrMapOvr>
+  <p:timing>
+    <p:tnLst>
+      <p:par>
+        <p:cTn id="1" dur="indefinite" restart="never" nodeType="tmRoot"/>
+      </p:par>
+    </p:tnLst>
+  </p:timing>
+</p:sld>
+</file>
+
+<file path=ppt/slides/slide15.xml><?xml version="1.0" encoding="utf-8"?>
 <p:sld xmlns:a="http://schemas.openxmlformats.org/drawingml/2006/main" xmlns:r="http://schemas.openxmlformats.org/officeDocument/2006/relationships" xmlns:p="http://schemas.openxmlformats.org/presentationml/2006/main">
   <p:cSld>
     <p:spTree>
@@ -9139,8 +9316,8 @@
         </p:nvSpPr>
         <p:spPr>
           <a:xfrm>
-            <a:off x="304800" y="76200"/>
-            <a:ext cx="8458200" cy="762000"/>
+            <a:off x="152400" y="76200"/>
+            <a:ext cx="8839200" cy="762000"/>
           </a:xfrm>
         </p:spPr>
         <p:txBody>
@@ -9148,8 +9325,8 @@
           <a:lstStyle/>
           <a:p>
             <a:r>
-              <a:rPr lang="en-US" sz="3600" b="1" dirty="0" smtClean="0"/>
-              <a:t>Inter-Processor Communication (IPC)</a:t>
+              <a:rPr lang="en-US" sz="3600" dirty="0" smtClean="0"/>
+              <a:t>Inter-Processor Communication (IPC) Usage</a:t>
             </a:r>
           </a:p>
         </p:txBody>
@@ -11712,237 +11889,6 @@
 </p:sld>
 </file>
 
-<file path=ppt/slides/slide15.xml><?xml version="1.0" encoding="utf-8"?>
-<p:sld xmlns:a="http://schemas.openxmlformats.org/drawingml/2006/main" xmlns:r="http://schemas.openxmlformats.org/officeDocument/2006/relationships" xmlns:p="http://schemas.openxmlformats.org/presentationml/2006/main">
-  <p:cSld>
-    <p:spTree>
-      <p:nvGrpSpPr>
-        <p:cNvPr id="1" name=""/>
-        <p:cNvGrpSpPr/>
-        <p:nvPr/>
-      </p:nvGrpSpPr>
-      <p:grpSpPr>
-        <a:xfrm>
-          <a:off x="0" y="0"/>
-          <a:ext cx="0" cy="0"/>
-          <a:chOff x="0" y="0"/>
-          <a:chExt cx="0" cy="0"/>
-        </a:xfrm>
-      </p:grpSpPr>
-      <p:sp>
-        <p:nvSpPr>
-          <p:cNvPr id="9218" name="Title 1"/>
-          <p:cNvSpPr>
-            <a:spLocks noGrp="1"/>
-          </p:cNvSpPr>
-          <p:nvPr>
-            <p:ph type="title"/>
-          </p:nvPr>
-        </p:nvSpPr>
-        <p:spPr>
-          <a:xfrm>
-            <a:off x="457200" y="0"/>
-            <a:ext cx="8229600" cy="715962"/>
-          </a:xfrm>
-        </p:spPr>
-        <p:txBody>
-          <a:bodyPr/>
-          <a:lstStyle/>
-          <a:p>
-            <a:pPr eaLnBrk="1" hangingPunct="1"/>
-            <a:r>
-              <a:rPr lang="en-US" dirty="0" smtClean="0"/>
-              <a:t>MCSDK </a:t>
-            </a:r>
-            <a:r>
-              <a:rPr lang="en-US" sz="3600" dirty="0" smtClean="0"/>
-              <a:t>Algorithm Libraries</a:t>
-            </a:r>
-          </a:p>
-        </p:txBody>
-      </p:sp>
-      <p:sp>
-        <p:nvSpPr>
-          <p:cNvPr id="9219" name="Content Placeholder 2"/>
-          <p:cNvSpPr>
-            <a:spLocks noGrp="1"/>
-          </p:cNvSpPr>
-          <p:nvPr>
-            <p:ph idx="1"/>
-          </p:nvPr>
-        </p:nvSpPr>
-        <p:spPr>
-          <a:xfrm>
-            <a:off x="457200" y="685800"/>
-            <a:ext cx="8229600" cy="5867400"/>
-          </a:xfrm>
-        </p:spPr>
-        <p:txBody>
-          <a:bodyPr/>
-          <a:lstStyle/>
-          <a:p>
-            <a:pPr marL="0" indent="0" eaLnBrk="1" hangingPunct="1">
-              <a:buNone/>
-            </a:pPr>
-            <a:r>
-              <a:rPr lang="en-US" sz="2000" dirty="0" smtClean="0"/>
-              <a:t>Algorithm libraries contain C66x C-callable, hand-coded, assembly-optimized functions for specific usage:</a:t>
-            </a:r>
-          </a:p>
-          <a:p>
-            <a:pPr eaLnBrk="1" hangingPunct="1"/>
-            <a:r>
-              <a:rPr lang="en-US" sz="1800" b="1" dirty="0" smtClean="0"/>
-              <a:t>DSPLIB</a:t>
-            </a:r>
-            <a:r>
-              <a:rPr lang="en-US" sz="1800" dirty="0" smtClean="0"/>
-              <a:t> provides signal-processing math and vector functions:</a:t>
-            </a:r>
-          </a:p>
-          <a:p>
-            <a:pPr lvl="1" eaLnBrk="1" hangingPunct="1"/>
-            <a:r>
-              <a:rPr lang="en-US" sz="1600" dirty="0" smtClean="0"/>
-              <a:t>Adaptive filtering</a:t>
-            </a:r>
-          </a:p>
-          <a:p>
-            <a:pPr lvl="1" eaLnBrk="1" hangingPunct="1"/>
-            <a:r>
-              <a:rPr lang="en-US" sz="1600" dirty="0" smtClean="0"/>
-              <a:t>Correlation</a:t>
-            </a:r>
-          </a:p>
-          <a:p>
-            <a:pPr lvl="1" eaLnBrk="1" hangingPunct="1"/>
-            <a:r>
-              <a:rPr lang="en-US" sz="1600" dirty="0" smtClean="0"/>
-              <a:t>FFT (e.g. FFT functions for ‘</a:t>
-            </a:r>
-            <a:r>
-              <a:rPr lang="en-US" sz="1600" dirty="0" err="1" smtClean="0"/>
-              <a:t>npoint</a:t>
-            </a:r>
-            <a:r>
-              <a:rPr lang="en-US" sz="1600" dirty="0" smtClean="0"/>
-              <a:t>’ FFTs)</a:t>
-            </a:r>
-          </a:p>
-          <a:p>
-            <a:pPr lvl="1" eaLnBrk="1" hangingPunct="1"/>
-            <a:r>
-              <a:rPr lang="en-US" sz="1600" dirty="0" smtClean="0"/>
-              <a:t>Filtering and Convolution (e.g., FIR, IIR filter functions, etc.)</a:t>
-            </a:r>
-          </a:p>
-          <a:p>
-            <a:pPr lvl="1" eaLnBrk="1" hangingPunct="1"/>
-            <a:r>
-              <a:rPr lang="en-US" sz="1600" dirty="0" smtClean="0"/>
-              <a:t>Matrix (e.g., single and double precision matrix multiplication, etc.)</a:t>
-            </a:r>
-          </a:p>
-          <a:p>
-            <a:pPr eaLnBrk="1" hangingPunct="1"/>
-            <a:r>
-              <a:rPr lang="en-US" sz="1800" b="1" dirty="0" smtClean="0"/>
-              <a:t>IMGLIB</a:t>
-            </a:r>
-            <a:r>
-              <a:rPr lang="en-US" sz="1800" dirty="0" smtClean="0"/>
-              <a:t> provides image/video processing functions:</a:t>
-            </a:r>
-          </a:p>
-          <a:p>
-            <a:pPr lvl="1" eaLnBrk="1" hangingPunct="1"/>
-            <a:r>
-              <a:rPr lang="en-US" sz="1600" dirty="0" smtClean="0"/>
-              <a:t>Compression &amp; Decompression (e.g., forward and inverse DCT, motion estimation, quantization, etc.)</a:t>
-            </a:r>
-          </a:p>
-          <a:p>
-            <a:pPr lvl="1" eaLnBrk="1" hangingPunct="1"/>
-            <a:r>
-              <a:rPr lang="en-US" sz="1600" dirty="0" smtClean="0"/>
-              <a:t>Image Analysis (e.g., edge detection, histogram, </a:t>
-            </a:r>
-            <a:r>
-              <a:rPr lang="en-US" sz="1600" dirty="0" err="1" smtClean="0"/>
-              <a:t>thresholding</a:t>
-            </a:r>
-            <a:r>
-              <a:rPr lang="en-US" sz="1600" dirty="0" smtClean="0"/>
-              <a:t>, etc.)</a:t>
-            </a:r>
-          </a:p>
-          <a:p>
-            <a:pPr lvl="1" eaLnBrk="1" hangingPunct="1"/>
-            <a:r>
-              <a:rPr lang="en-US" sz="1600" dirty="0" smtClean="0"/>
-              <a:t>Image Filtering and Conversion (e.g., color space conversion, convolution, correlation,  error diffusion, etc.)</a:t>
-            </a:r>
-          </a:p>
-          <a:p>
-            <a:pPr eaLnBrk="1" hangingPunct="1"/>
-            <a:r>
-              <a:rPr lang="en-US" sz="1800" b="1" dirty="0" err="1" smtClean="0"/>
-              <a:t>MathLIB</a:t>
-            </a:r>
-            <a:r>
-              <a:rPr lang="en-US" sz="1800" dirty="0" smtClean="0"/>
-              <a:t> provides floating-point math functions:</a:t>
-            </a:r>
-          </a:p>
-          <a:p>
-            <a:pPr lvl="1" eaLnBrk="1" hangingPunct="1"/>
-            <a:r>
-              <a:rPr lang="en-US" sz="1600" dirty="0" smtClean="0"/>
-              <a:t>Single-precision (e.g., cosine/sine/tangent of a floating point number, etc.)</a:t>
-            </a:r>
-          </a:p>
-          <a:p>
-            <a:pPr lvl="1" eaLnBrk="1" hangingPunct="1"/>
-            <a:r>
-              <a:rPr lang="en-US" sz="1600" dirty="0" smtClean="0"/>
-              <a:t>Double precision (e.g., similar functions as above with argument type and return values to be of type double)</a:t>
-            </a:r>
-          </a:p>
-          <a:p>
-            <a:pPr eaLnBrk="1" hangingPunct="1"/>
-            <a:r>
-              <a:rPr lang="en-US" sz="2000" dirty="0" smtClean="0"/>
-              <a:t>More info: </a:t>
-            </a:r>
-            <a:r>
-              <a:rPr lang="en-US" sz="2000" dirty="0" smtClean="0">
-                <a:hlinkClick r:id="rId2"/>
-              </a:rPr>
-              <a:t>http://processors.wiki.ti.com/index.php/Software_libraries</a:t>
-            </a:r>
-            <a:endParaRPr lang="en-US" sz="2000" dirty="0" smtClean="0"/>
-          </a:p>
-          <a:p>
-            <a:pPr eaLnBrk="1" hangingPunct="1"/>
-            <a:endParaRPr lang="en-US" sz="2000" dirty="0" smtClean="0"/>
-          </a:p>
-        </p:txBody>
-      </p:sp>
-    </p:spTree>
-  </p:cSld>
-  <p:clrMapOvr>
-    <a:masterClrMapping/>
-  </p:clrMapOvr>
-  <p:timing>
-    <p:tnLst>
-      <p:par>
-        <p:cTn id="1" dur="indefinite" restart="never" nodeType="tmRoot"/>
-      </p:par>
-    </p:tnLst>
-  </p:timing>
-</p:sld>
-</file>
-
 <file path=ppt/slides/slide16.xml><?xml version="1.0" encoding="utf-8"?>
 <p:sld xmlns:a="http://schemas.openxmlformats.org/drawingml/2006/main" xmlns:r="http://schemas.openxmlformats.org/officeDocument/2006/relationships" xmlns:p="http://schemas.openxmlformats.org/presentationml/2006/main">
   <p:cSld>
@@ -11977,7 +11923,7 @@
           <a:p>
             <a:pPr eaLnBrk="1" hangingPunct="1"/>
             <a:r>
-              <a:rPr lang="en-US" sz="3600" b="1" dirty="0" smtClean="0"/>
+              <a:rPr lang="en-US" sz="3600" dirty="0" smtClean="0"/>
               <a:t>Simplified Development &amp; Migration</a:t>
             </a:r>
           </a:p>
@@ -12093,7 +12039,7 @@
                   <a:spcPct val="0"/>
                 </a:spcAft>
               </a:pPr>
-              <a:endParaRPr lang="en-US">
+              <a:endParaRPr lang="en-US" dirty="0">
                 <a:solidFill>
                   <a:prstClr val="black"/>
                 </a:solidFill>
@@ -12203,7 +12149,7 @@
                 <a:buSzPct val="85000"/>
               </a:pPr>
               <a:r>
-                <a:rPr lang="en-US" sz="900" b="1">
+                <a:rPr lang="en-US" sz="900" b="1" dirty="0">
                   <a:solidFill>
                     <a:prstClr val="black"/>
                   </a:solidFill>
@@ -12261,7 +12207,7 @@
                 <a:buSzPct val="85000"/>
               </a:pPr>
               <a:r>
-                <a:rPr lang="en-US" sz="900" b="1">
+                <a:rPr lang="en-US" sz="900" b="1" dirty="0">
                   <a:solidFill>
                     <a:prstClr val="black"/>
                   </a:solidFill>
@@ -12499,7 +12445,7 @@
                 <a:buSzPct val="85000"/>
               </a:pPr>
               <a:r>
-                <a:rPr lang="en-US" sz="800" b="1">
+                <a:rPr lang="en-US" sz="800" b="1" dirty="0">
                   <a:solidFill>
                     <a:prstClr val="black"/>
                   </a:solidFill>
@@ -12611,7 +12557,7 @@
                 <a:buSzPct val="85000"/>
               </a:pPr>
               <a:r>
-                <a:rPr lang="en-US" sz="800" b="1">
+                <a:rPr lang="en-US" sz="800" b="1" dirty="0">
                   <a:solidFill>
                     <a:prstClr val="black"/>
                   </a:solidFill>
@@ -12663,7 +12609,7 @@
                   <a:spcPct val="0"/>
                 </a:spcAft>
               </a:pPr>
-              <a:endParaRPr lang="en-US">
+              <a:endParaRPr lang="en-US" dirty="0">
                 <a:solidFill>
                   <a:prstClr val="black"/>
                 </a:solidFill>
@@ -12848,7 +12794,7 @@
                 <a:buSzPct val="85000"/>
               </a:pPr>
               <a:r>
-                <a:rPr lang="en-US" sz="800" b="1">
+                <a:rPr lang="en-US" sz="800" b="1" dirty="0">
                   <a:solidFill>
                     <a:prstClr val="black"/>
                   </a:solidFill>
@@ -12906,7 +12852,7 @@
                 <a:buSzPct val="85000"/>
               </a:pPr>
               <a:r>
-                <a:rPr lang="en-US" sz="1400">
+                <a:rPr lang="en-US" sz="1400" dirty="0">
                   <a:solidFill>
                     <a:prstClr val="black"/>
                   </a:solidFill>
@@ -13068,7 +13014,7 @@
                 <a:buSzPct val="85000"/>
               </a:pPr>
               <a:r>
-                <a:rPr lang="en-US" sz="800" b="1">
+                <a:rPr lang="en-US" sz="800" b="1" dirty="0">
                   <a:solidFill>
                     <a:prstClr val="black"/>
                   </a:solidFill>
@@ -13126,7 +13072,7 @@
                 <a:buSzPct val="85000"/>
               </a:pPr>
               <a:r>
-                <a:rPr lang="en-US" sz="800" b="1">
+                <a:rPr lang="en-US" sz="800" b="1" dirty="0">
                   <a:solidFill>
                     <a:prstClr val="black"/>
                   </a:solidFill>
@@ -13483,7 +13429,7 @@
                   <a:spcPct val="0"/>
                 </a:spcAft>
               </a:pPr>
-              <a:endParaRPr lang="en-US">
+              <a:endParaRPr lang="en-US" dirty="0">
                 <a:solidFill>
                   <a:prstClr val="black"/>
                 </a:solidFill>
@@ -13591,7 +13537,7 @@
                 <a:buSzPct val="85000"/>
               </a:pPr>
               <a:r>
-                <a:rPr lang="en-US" sz="800" b="1">
+                <a:rPr lang="en-US" sz="800" b="1" dirty="0">
                   <a:solidFill>
                     <a:prstClr val="black"/>
                   </a:solidFill>
@@ -13703,7 +13649,7 @@
                 <a:buSzPct val="85000"/>
               </a:pPr>
               <a:r>
-                <a:rPr lang="en-US" sz="800" b="1">
+                <a:rPr lang="en-US" sz="800" b="1" dirty="0">
                   <a:solidFill>
                     <a:prstClr val="black"/>
                   </a:solidFill>
@@ -13933,7 +13879,7 @@
                 <a:buSzPct val="85000"/>
               </a:pPr>
               <a:r>
-                <a:rPr lang="en-US" sz="800" b="1">
+                <a:rPr lang="en-US" sz="800" b="1" dirty="0">
                   <a:solidFill>
                     <a:prstClr val="black"/>
                   </a:solidFill>
@@ -13991,7 +13937,7 @@
                 <a:buSzPct val="85000"/>
               </a:pPr>
               <a:r>
-                <a:rPr lang="en-US" sz="800" b="1">
+                <a:rPr lang="en-US" sz="800" b="1" dirty="0">
                   <a:solidFill>
                     <a:prstClr val="black"/>
                   </a:solidFill>
@@ -14043,7 +13989,7 @@
                   <a:spcPct val="0"/>
                 </a:spcAft>
               </a:pPr>
-              <a:endParaRPr lang="en-US">
+              <a:endParaRPr lang="en-US" dirty="0">
                 <a:solidFill>
                   <a:prstClr val="black"/>
                 </a:solidFill>
@@ -14590,7 +14536,7 @@
                   <a:spcPct val="0"/>
                 </a:spcAft>
               </a:pPr>
-              <a:endParaRPr lang="en-US">
+              <a:endParaRPr lang="en-US" dirty="0">
                 <a:solidFill>
                   <a:prstClr val="black"/>
                 </a:solidFill>
@@ -14698,7 +14644,7 @@
                 <a:buSzPct val="85000"/>
               </a:pPr>
               <a:r>
-                <a:rPr lang="en-US" sz="800" b="1">
+                <a:rPr lang="en-US" sz="800" b="1" dirty="0">
                   <a:solidFill>
                     <a:prstClr val="black"/>
                   </a:solidFill>
@@ -14810,7 +14756,7 @@
                 <a:buSzPct val="85000"/>
               </a:pPr>
               <a:r>
-                <a:rPr lang="en-US" sz="800" b="1">
+                <a:rPr lang="en-US" sz="800" b="1" dirty="0">
                   <a:solidFill>
                     <a:prstClr val="black"/>
                   </a:solidFill>
@@ -14862,7 +14808,7 @@
                   <a:spcPct val="0"/>
                 </a:spcAft>
               </a:pPr>
-              <a:endParaRPr lang="en-US">
+              <a:endParaRPr lang="en-US" dirty="0">
                 <a:solidFill>
                   <a:prstClr val="black"/>
                 </a:solidFill>
@@ -15151,7 +15097,7 @@
                 <a:buSzPct val="85000"/>
               </a:pPr>
               <a:r>
-                <a:rPr lang="en-US" sz="800" b="1">
+                <a:rPr lang="en-US" sz="800" b="1" dirty="0">
                   <a:solidFill>
                     <a:prstClr val="black"/>
                   </a:solidFill>
@@ -15209,7 +15155,7 @@
                 <a:buSzPct val="85000"/>
               </a:pPr>
               <a:r>
-                <a:rPr lang="en-US" sz="800" b="1">
+                <a:rPr lang="en-US" sz="800" b="1" dirty="0">
                   <a:solidFill>
                     <a:prstClr val="black"/>
                   </a:solidFill>
@@ -15501,7 +15447,7 @@
                 <a:buSzPct val="85000"/>
               </a:pPr>
               <a:r>
-                <a:rPr lang="en-US" sz="1400" b="1">
+                <a:rPr lang="en-US" sz="1400" b="1" dirty="0">
                   <a:solidFill>
                     <a:prstClr val="black"/>
                   </a:solidFill>
@@ -15511,7 +15457,7 @@
                 <a:t>Customer Application</a:t>
               </a:r>
               <a:r>
-                <a:rPr lang="en-US" sz="1400">
+                <a:rPr lang="en-US" sz="1400" dirty="0">
                   <a:solidFill>
                     <a:prstClr val="black"/>
                   </a:solidFill>
@@ -15569,7 +15515,7 @@
                 <a:buSzPct val="85000"/>
               </a:pPr>
               <a:r>
-                <a:rPr lang="en-US" sz="800" b="1">
+                <a:rPr lang="en-US" sz="800" b="1" dirty="0">
                   <a:solidFill>
                     <a:prstClr val="black"/>
                   </a:solidFill>
@@ -15620,7 +15566,7 @@
                 <a:spcPct val="0"/>
               </a:spcAft>
             </a:pPr>
-            <a:endParaRPr lang="en-US">
+            <a:endParaRPr lang="en-US" dirty="0">
               <a:solidFill>
                 <a:prstClr val="black"/>
               </a:solidFill>
@@ -15745,7 +15691,7 @@
                   <a:spcPct val="0"/>
                 </a:spcAft>
               </a:pPr>
-              <a:endParaRPr lang="en-US">
+              <a:endParaRPr lang="en-US" dirty="0">
                 <a:solidFill>
                   <a:prstClr val="black"/>
                 </a:solidFill>
@@ -15853,7 +15799,7 @@
                 <a:buSzPct val="85000"/>
               </a:pPr>
               <a:r>
-                <a:rPr lang="en-US" sz="800" b="1">
+                <a:rPr lang="en-US" sz="800" b="1" dirty="0">
                   <a:solidFill>
                     <a:prstClr val="black"/>
                   </a:solidFill>
@@ -15975,16 +15921,6 @@
                 <a:t>Next Gen TI </a:t>
               </a:r>
               <a:r>
-                <a:rPr lang="en-US" sz="800" b="1" dirty="0" err="1" smtClean="0">
-                  <a:solidFill>
-                    <a:prstClr val="black"/>
-                  </a:solidFill>
-                  <a:latin typeface="Trebuchet MS" pitchFamily="34" charset="0"/>
-                  <a:cs typeface="Arial" charset="0"/>
-                </a:rPr>
-                <a:t>SoC</a:t>
-              </a:r>
-              <a:r>
                 <a:rPr lang="en-US" sz="800" b="1" dirty="0" smtClean="0">
                   <a:solidFill>
                     <a:prstClr val="black"/>
@@ -15992,7 +15928,7 @@
                   <a:latin typeface="Trebuchet MS" pitchFamily="34" charset="0"/>
                   <a:cs typeface="Arial" charset="0"/>
                 </a:rPr>
-                <a:t> Platform</a:t>
+                <a:t>SoC Platform</a:t>
               </a:r>
               <a:endParaRPr lang="en-US" sz="800" b="1" dirty="0">
                 <a:solidFill>
@@ -16044,7 +15980,7 @@
                   <a:spcPct val="0"/>
                 </a:spcAft>
               </a:pPr>
-              <a:endParaRPr lang="en-US">
+              <a:endParaRPr lang="en-US" dirty="0">
                 <a:solidFill>
                   <a:prstClr val="black"/>
                 </a:solidFill>
@@ -16333,7 +16269,7 @@
                 <a:buSzPct val="85000"/>
               </a:pPr>
               <a:r>
-                <a:rPr lang="en-US" sz="800" b="1">
+                <a:rPr lang="en-US" sz="800" b="1" dirty="0">
                   <a:solidFill>
                     <a:prstClr val="black"/>
                   </a:solidFill>
@@ -16391,7 +16327,7 @@
                 <a:buSzPct val="85000"/>
               </a:pPr>
               <a:r>
-                <a:rPr lang="en-US" sz="800" b="1">
+                <a:rPr lang="en-US" sz="800" b="1" dirty="0">
                   <a:solidFill>
                     <a:prstClr val="black"/>
                   </a:solidFill>
@@ -16683,7 +16619,7 @@
                 <a:buSzPct val="85000"/>
               </a:pPr>
               <a:r>
-                <a:rPr lang="en-US" sz="1400">
+                <a:rPr lang="en-US" sz="1400" dirty="0">
                   <a:solidFill>
                     <a:prstClr val="black"/>
                   </a:solidFill>
@@ -16693,7 +16629,7 @@
                 <a:t>Customer App on </a:t>
               </a:r>
               <a:r>
-                <a:rPr lang="en-US" sz="1400" b="1">
+                <a:rPr lang="en-US" sz="1400" b="1" dirty="0">
                   <a:solidFill>
                     <a:prstClr val="black"/>
                   </a:solidFill>
@@ -16751,7 +16687,7 @@
                 <a:buSzPct val="85000"/>
               </a:pPr>
               <a:r>
-                <a:rPr lang="en-US" sz="800" b="1">
+                <a:rPr lang="en-US" sz="800" b="1" dirty="0">
                   <a:solidFill>
                     <a:prstClr val="black"/>
                   </a:solidFill>
@@ -16802,7 +16738,7 @@
                 <a:spcPct val="0"/>
               </a:spcAft>
             </a:pPr>
-            <a:endParaRPr lang="en-US">
+            <a:endParaRPr lang="en-US" dirty="0">
               <a:solidFill>
                 <a:prstClr val="black"/>
               </a:solidFill>
@@ -16850,7 +16786,7 @@
                 <a:spcPct val="0"/>
               </a:spcAft>
             </a:pPr>
-            <a:endParaRPr lang="en-US">
+            <a:endParaRPr lang="en-US" dirty="0">
               <a:solidFill>
                 <a:prstClr val="black"/>
               </a:solidFill>
@@ -18319,42 +18255,26 @@
                 <a:ea typeface="ＭＳ Ｐゴシック" pitchFamily="34" charset="-128"/>
                 <a:cs typeface="Arial" charset="0"/>
               </a:rPr>
-              <a:t>Multicore </a:t>
-            </a:r>
+              <a:t>Multicore Software</a:t>
+            </a:r>
+          </a:p>
+          <a:p>
+            <a:pPr algn="ctr" fontAlgn="base">
+              <a:spcBef>
+                <a:spcPct val="0"/>
+              </a:spcBef>
+              <a:spcAft>
+                <a:spcPct val="0"/>
+              </a:spcAft>
+              <a:defRPr/>
+            </a:pPr>
             <a:r>
               <a:rPr lang="en-US" sz="1600" b="1" dirty="0" smtClean="0">
                 <a:latin typeface="Arial" pitchFamily="34" charset="0"/>
                 <a:ea typeface="ＭＳ Ｐゴシック" pitchFamily="34" charset="-128"/>
                 <a:cs typeface="Arial" charset="0"/>
               </a:rPr>
-              <a:t>Software</a:t>
-            </a:r>
-          </a:p>
-          <a:p>
-            <a:pPr algn="ctr" fontAlgn="base">
-              <a:spcBef>
-                <a:spcPct val="0"/>
-              </a:spcBef>
-              <a:spcAft>
-                <a:spcPct val="0"/>
-              </a:spcAft>
-              <a:defRPr/>
-            </a:pPr>
-            <a:r>
-              <a:rPr lang="en-US" sz="1600" b="1" dirty="0" smtClean="0">
-                <a:latin typeface="Arial" pitchFamily="34" charset="0"/>
-                <a:ea typeface="ＭＳ Ｐゴシック" pitchFamily="34" charset="-128"/>
-                <a:cs typeface="Arial" charset="0"/>
-              </a:rPr>
-              <a:t>Development </a:t>
-            </a:r>
-            <a:r>
-              <a:rPr lang="en-US" sz="1600" b="1" dirty="0" smtClean="0">
-                <a:latin typeface="Arial" pitchFamily="34" charset="0"/>
-                <a:ea typeface="ＭＳ Ｐゴシック" pitchFamily="34" charset="-128"/>
-                <a:cs typeface="Arial" charset="0"/>
-              </a:rPr>
-              <a:t>Kit</a:t>
+              <a:t>Development Kit</a:t>
             </a:r>
           </a:p>
           <a:p>
@@ -18512,19 +18432,15 @@
           <a:p>
             <a:pPr eaLnBrk="1" hangingPunct="1"/>
             <a:r>
-              <a:rPr lang="en-US" sz="3200" b="1" dirty="0" smtClean="0"/>
+              <a:rPr lang="en-US" sz="3600" dirty="0" smtClean="0"/>
               <a:t>TI Software Development Ecosystem</a:t>
             </a:r>
-            <a:r>
-              <a:rPr lang="en-US" b="1" dirty="0" smtClean="0"/>
-              <a:t/>
-            </a:r>
             <a:br>
-              <a:rPr lang="en-US" b="1" dirty="0" smtClean="0"/>
+              <a:rPr lang="en-US" sz="3600" dirty="0" smtClean="0"/>
             </a:br>
             <a:r>
-              <a:rPr lang="en-US" sz="2400" b="1" dirty="0" smtClean="0"/>
-              <a:t>Multicore Performance, Single-core Simplicity</a:t>
+              <a:rPr lang="en-US" sz="2400" dirty="0" smtClean="0"/>
+              <a:t>Third Party Software Plug-ins</a:t>
             </a:r>
           </a:p>
         </p:txBody>
@@ -19377,15 +19293,7 @@
           <a:p>
             <a:r>
               <a:rPr lang="en-US" sz="2000" b="1" dirty="0" smtClean="0"/>
-              <a:t>Poly-Platform from </a:t>
-            </a:r>
-            <a:r>
-              <a:rPr lang="en-US" sz="2000" b="1" dirty="0" err="1" smtClean="0"/>
-              <a:t>PolyCore</a:t>
-            </a:r>
-            <a:r>
-              <a:rPr lang="en-US" sz="2000" b="1" dirty="0" smtClean="0"/>
-              <a:t> </a:t>
+              <a:t>Poly-Platform from PolyCore </a:t>
             </a:r>
             <a:r>
               <a:rPr lang="en-US" sz="2000" dirty="0" smtClean="0">
@@ -19401,15 +19309,7 @@
           <a:p>
             <a:r>
               <a:rPr lang="en-US" sz="2000" b="1" dirty="0" smtClean="0"/>
-              <a:t>Prism from </a:t>
-            </a:r>
-            <a:r>
-              <a:rPr lang="en-US" sz="2000" b="1" dirty="0" err="1" smtClean="0"/>
-              <a:t>CriticalBlue</a:t>
-            </a:r>
-            <a:r>
-              <a:rPr lang="en-US" sz="2000" b="1" dirty="0" smtClean="0"/>
-              <a:t> </a:t>
+              <a:t>Prism from CriticalBlue </a:t>
             </a:r>
             <a:r>
               <a:rPr lang="en-US" sz="2000" dirty="0" smtClean="0">
@@ -20248,42 +20148,26 @@
                 <a:ea typeface="ＭＳ Ｐゴシック" pitchFamily="34" charset="-128"/>
                 <a:cs typeface="Arial" charset="0"/>
               </a:rPr>
-              <a:t>Multicore </a:t>
-            </a:r>
+              <a:t>Multicore Software</a:t>
+            </a:r>
+          </a:p>
+          <a:p>
+            <a:pPr algn="ctr" fontAlgn="base">
+              <a:spcBef>
+                <a:spcPct val="0"/>
+              </a:spcBef>
+              <a:spcAft>
+                <a:spcPct val="0"/>
+              </a:spcAft>
+              <a:defRPr/>
+            </a:pPr>
             <a:r>
               <a:rPr lang="en-US" sz="1600" b="1" dirty="0" smtClean="0">
                 <a:latin typeface="Arial" pitchFamily="34" charset="0"/>
                 <a:ea typeface="ＭＳ Ｐゴシック" pitchFamily="34" charset="-128"/>
                 <a:cs typeface="Arial" charset="0"/>
               </a:rPr>
-              <a:t>Software</a:t>
-            </a:r>
-          </a:p>
-          <a:p>
-            <a:pPr algn="ctr" fontAlgn="base">
-              <a:spcBef>
-                <a:spcPct val="0"/>
-              </a:spcBef>
-              <a:spcAft>
-                <a:spcPct val="0"/>
-              </a:spcAft>
-              <a:defRPr/>
-            </a:pPr>
-            <a:r>
-              <a:rPr lang="en-US" sz="1600" b="1" dirty="0" smtClean="0">
-                <a:latin typeface="Arial" pitchFamily="34" charset="0"/>
-                <a:ea typeface="ＭＳ Ｐゴシック" pitchFamily="34" charset="-128"/>
-                <a:cs typeface="Arial" charset="0"/>
-              </a:rPr>
-              <a:t>Development </a:t>
-            </a:r>
-            <a:r>
-              <a:rPr lang="en-US" sz="1600" b="1" dirty="0" smtClean="0">
-                <a:latin typeface="Arial" pitchFamily="34" charset="0"/>
-                <a:ea typeface="ＭＳ Ｐゴシック" pitchFamily="34" charset="-128"/>
-                <a:cs typeface="Arial" charset="0"/>
-              </a:rPr>
-              <a:t>Kit</a:t>
+              <a:t>Development Kit</a:t>
             </a:r>
           </a:p>
           <a:p>
@@ -20334,18 +20218,14 @@
           <a:p>
             <a:pPr eaLnBrk="1" hangingPunct="1"/>
             <a:r>
-              <a:rPr lang="en-US" sz="3200" b="1" dirty="0" smtClean="0"/>
+              <a:rPr lang="en-US" sz="3600" dirty="0" smtClean="0"/>
               <a:t>TI Software Development Ecosystem</a:t>
             </a:r>
-            <a:r>
-              <a:rPr lang="en-US" b="1" dirty="0" smtClean="0"/>
-              <a:t/>
-            </a:r>
             <a:br>
-              <a:rPr lang="en-US" b="1" dirty="0" smtClean="0"/>
+              <a:rPr lang="en-US" sz="3600" dirty="0" smtClean="0"/>
             </a:br>
             <a:r>
-              <a:rPr lang="en-US" sz="2400" b="1" dirty="0" smtClean="0"/>
+              <a:rPr lang="en-US" sz="2400" dirty="0" smtClean="0"/>
               <a:t>Multicore Performance, Single-core Simplicity</a:t>
             </a:r>
           </a:p>
@@ -21595,7 +21475,7 @@
                 <a:latin typeface="Calibri" pitchFamily="34" charset="0"/>
                 <a:cs typeface="Calibri" pitchFamily="34" charset="0"/>
               </a:rPr>
-              <a:t>Operating System Basics</a:t>
+              <a:t>Software System Basics</a:t>
             </a:r>
           </a:p>
           <a:p>
@@ -21604,7 +21484,7 @@
                 <a:latin typeface="Calibri" pitchFamily="34" charset="0"/>
                 <a:cs typeface="Calibri" pitchFamily="34" charset="0"/>
               </a:rPr>
-              <a:t>TI’s Traditional Development Support</a:t>
+              <a:t>DSP Development Support</a:t>
             </a:r>
           </a:p>
           <a:p>
@@ -21740,24 +21620,14 @@
           <a:p>
             <a:r>
               <a:rPr lang="en-US" dirty="0" smtClean="0"/>
-              <a:t>/</a:t>
-            </a:r>
-            <a:r>
-              <a:rPr lang="en-US" dirty="0" err="1" smtClean="0"/>
-              <a:t>mcsdk</a:t>
-            </a:r>
-            <a:endParaRPr lang="en-US" dirty="0" smtClean="0"/>
+              <a:t>/mcsdk</a:t>
+            </a:r>
           </a:p>
           <a:p>
             <a:r>
               <a:rPr lang="en-US" dirty="0" smtClean="0"/>
-              <a:t>/</a:t>
-            </a:r>
-            <a:r>
-              <a:rPr lang="en-US" dirty="0" err="1" smtClean="0"/>
-              <a:t>pdk</a:t>
-            </a:r>
-            <a:endParaRPr lang="en-US" dirty="0" smtClean="0"/>
+              <a:t>/pdk</a:t>
+            </a:r>
           </a:p>
           <a:p>
             <a:r>
@@ -21774,55 +21644,31 @@
           <a:p>
             <a:r>
               <a:rPr lang="en-US" dirty="0" smtClean="0"/>
-              <a:t>/</a:t>
-            </a:r>
-            <a:r>
-              <a:rPr lang="en-US" dirty="0" err="1" smtClean="0"/>
-              <a:t>dsplib</a:t>
-            </a:r>
-            <a:endParaRPr lang="en-US" dirty="0" smtClean="0"/>
+              <a:t>/dsplib</a:t>
+            </a:r>
           </a:p>
           <a:p>
             <a:r>
               <a:rPr lang="en-US" dirty="0" smtClean="0"/>
-              <a:t>/</a:t>
-            </a:r>
-            <a:r>
-              <a:rPr lang="en-US" dirty="0" err="1" smtClean="0"/>
-              <a:t>imglib</a:t>
-            </a:r>
-            <a:endParaRPr lang="en-US" dirty="0" smtClean="0"/>
+              <a:t>/imglib</a:t>
+            </a:r>
           </a:p>
           <a:p>
             <a:r>
               <a:rPr lang="en-US" dirty="0" smtClean="0"/>
-              <a:t>/</a:t>
-            </a:r>
-            <a:r>
-              <a:rPr lang="en-US" dirty="0" err="1" smtClean="0"/>
-              <a:t>mathlib</a:t>
-            </a:r>
-            <a:endParaRPr lang="en-US" dirty="0" smtClean="0"/>
+              <a:t>/mathlib</a:t>
+            </a:r>
           </a:p>
           <a:p>
             <a:r>
               <a:rPr lang="en-US" dirty="0" smtClean="0"/>
-              <a:t>/</a:t>
-            </a:r>
-            <a:r>
-              <a:rPr lang="en-US" dirty="0" err="1" smtClean="0"/>
-              <a:t>ipc</a:t>
-            </a:r>
-            <a:endParaRPr lang="en-US" dirty="0" smtClean="0"/>
+              <a:t>/ipc</a:t>
+            </a:r>
           </a:p>
           <a:p>
             <a:r>
               <a:rPr lang="en-US" dirty="0" smtClean="0"/>
-              <a:t>/</a:t>
-            </a:r>
-            <a:r>
-              <a:rPr lang="en-US" dirty="0" err="1" smtClean="0"/>
-              <a:t>ndk</a:t>
+              <a:t>/ndk</a:t>
             </a:r>
             <a:endParaRPr lang="en-US" dirty="0"/>
           </a:p>
@@ -22065,7 +21911,7 @@
           <a:p>
             <a:r>
               <a:rPr lang="en-US" sz="3600" dirty="0" smtClean="0"/>
-              <a:t>Operating System Basics</a:t>
+              <a:t>Software System Basics</a:t>
             </a:r>
             <a:endParaRPr lang="en-US" sz="3600" dirty="0"/>
           </a:p>
@@ -22089,7 +21935,7 @@
         </p:spPr>
         <p:txBody>
           <a:bodyPr>
-            <a:normAutofit fontScale="85000" lnSpcReduction="20000"/>
+            <a:normAutofit fontScale="92500" lnSpcReduction="20000"/>
           </a:bodyPr>
           <a:lstStyle/>
           <a:p>
@@ -22098,25 +21944,7 @@
                 <a:latin typeface="Calibri" pitchFamily="34" charset="0"/>
                 <a:cs typeface="Calibri" pitchFamily="34" charset="0"/>
               </a:rPr>
-              <a:t>On the surface, </a:t>
-            </a:r>
-            <a:r>
-              <a:rPr lang="en-US" sz="2400" dirty="0" smtClean="0"/>
-              <a:t>an</a:t>
-            </a:r>
-            <a:r>
-              <a:rPr lang="en-US" sz="2400" dirty="0" smtClean="0">
-                <a:latin typeface="Calibri" pitchFamily="34" charset="0"/>
-                <a:cs typeface="Calibri" pitchFamily="34" charset="0"/>
-              </a:rPr>
-              <a:t> </a:t>
-            </a:r>
-            <a:r>
-              <a:rPr lang="en-US" sz="2400" dirty="0" smtClean="0">
-                <a:latin typeface="Calibri" pitchFamily="34" charset="0"/>
-                <a:cs typeface="Calibri" pitchFamily="34" charset="0"/>
-              </a:rPr>
-              <a:t>OS provides:</a:t>
+              <a:t>Utilizing system hardware peripherals</a:t>
             </a:r>
           </a:p>
           <a:p>
@@ -22126,7 +21954,46 @@
                 <a:latin typeface="Calibri" pitchFamily="34" charset="0"/>
                 <a:cs typeface="Calibri" pitchFamily="34" charset="0"/>
               </a:rPr>
-              <a:t>Management, scheduling, and prioritization of system-level memory, processors, and input/output devices to enable multiple processes/threads.</a:t>
+              <a:t>Low level drivers (LLD) to abstract communication with the hardware layer, including device-specific modules/interfaces (from one or more manufacturers)</a:t>
+            </a:r>
+          </a:p>
+          <a:p>
+            <a:pPr lvl="1"/>
+            <a:r>
+              <a:rPr lang="en-US" sz="1800" dirty="0" smtClean="0">
+                <a:latin typeface="Calibri" pitchFamily="34" charset="0"/>
+                <a:cs typeface="Calibri" pitchFamily="34" charset="0"/>
+              </a:rPr>
+              <a:t>One or more layers of utility APIs (routines, structures, variables, etc.) that connect the application to the LLD</a:t>
+            </a:r>
+          </a:p>
+          <a:p>
+            <a:r>
+              <a:rPr lang="en-US" sz="2200" dirty="0" smtClean="0">
+                <a:latin typeface="Calibri" pitchFamily="34" charset="0"/>
+                <a:cs typeface="Calibri" pitchFamily="34" charset="0"/>
+              </a:rPr>
+              <a:t>Running applications</a:t>
+            </a:r>
+          </a:p>
+          <a:p>
+            <a:pPr lvl="1"/>
+            <a:r>
+              <a:rPr lang="en-US" sz="1800" dirty="0" smtClean="0">
+                <a:latin typeface="Calibri" pitchFamily="34" charset="0"/>
+                <a:cs typeface="Calibri" pitchFamily="34" charset="0"/>
+              </a:rPr>
+              <a:t>Management, scheduling, and prioritization of  threads</a:t>
+            </a:r>
+          </a:p>
+          <a:p>
+            <a:pPr lvl="1"/>
+            <a:r>
+              <a:rPr lang="en-US" sz="1800" dirty="0" smtClean="0">
+                <a:latin typeface="Calibri" pitchFamily="34" charset="0"/>
+                <a:cs typeface="Calibri" pitchFamily="34" charset="0"/>
+              </a:rPr>
+              <a:t>Managing memory, processors, and input/output devices</a:t>
             </a:r>
           </a:p>
           <a:p>
@@ -22170,104 +22037,12 @@
             </a:r>
           </a:p>
           <a:p>
-            <a:pPr lvl="1"/>
-            <a:r>
-              <a:rPr lang="en-US" sz="1800" dirty="0" smtClean="0">
-                <a:latin typeface="Calibri" pitchFamily="34" charset="0"/>
-                <a:cs typeface="Calibri" pitchFamily="34" charset="0"/>
-              </a:rPr>
-              <a:t>Mediation </a:t>
-            </a:r>
-            <a:r>
-              <a:rPr lang="en-US" sz="1800" dirty="0" smtClean="0">
-                <a:latin typeface="Calibri" pitchFamily="34" charset="0"/>
-                <a:cs typeface="Calibri" pitchFamily="34" charset="0"/>
-              </a:rPr>
-              <a:t>to </a:t>
-            </a:r>
-            <a:r>
-              <a:rPr lang="en-US" sz="1800" dirty="0" smtClean="0">
-                <a:latin typeface="Calibri" pitchFamily="34" charset="0"/>
-                <a:cs typeface="Calibri" pitchFamily="34" charset="0"/>
-              </a:rPr>
-              <a:t>abstract </a:t>
-            </a:r>
-            <a:r>
-              <a:rPr lang="en-US" sz="1800" dirty="0" smtClean="0">
-                <a:latin typeface="Calibri" pitchFamily="34" charset="0"/>
-                <a:cs typeface="Calibri" pitchFamily="34" charset="0"/>
-              </a:rPr>
-              <a:t>hardware and driver details from the application</a:t>
-            </a:r>
-          </a:p>
-          <a:p>
             <a:r>
               <a:rPr lang="en-US" sz="2400" dirty="0" smtClean="0">
                 <a:latin typeface="Calibri" pitchFamily="34" charset="0"/>
                 <a:cs typeface="Calibri" pitchFamily="34" charset="0"/>
               </a:rPr>
-              <a:t>Looking under the hood, </a:t>
-            </a:r>
-            <a:r>
-              <a:rPr lang="en-US" sz="2400" dirty="0" smtClean="0">
-                <a:latin typeface="Calibri" pitchFamily="34" charset="0"/>
-                <a:cs typeface="Calibri" pitchFamily="34" charset="0"/>
-              </a:rPr>
-              <a:t>an </a:t>
-            </a:r>
-            <a:r>
-              <a:rPr lang="en-US" sz="2400" dirty="0" smtClean="0">
-                <a:latin typeface="Calibri" pitchFamily="34" charset="0"/>
-                <a:cs typeface="Calibri" pitchFamily="34" charset="0"/>
-              </a:rPr>
-              <a:t>OS also provides:</a:t>
-            </a:r>
-          </a:p>
-          <a:p>
-            <a:pPr lvl="1"/>
-            <a:r>
-              <a:rPr lang="en-US" sz="1800" dirty="0" smtClean="0">
-                <a:latin typeface="Calibri" pitchFamily="34" charset="0"/>
-                <a:cs typeface="Calibri" pitchFamily="34" charset="0"/>
-              </a:rPr>
-              <a:t>Low level drivers (LLD) to abstract communication with the hardware layer, including device-specific modules/interfaces (from one or more manufacturers)</a:t>
-            </a:r>
-          </a:p>
-          <a:p>
-            <a:pPr lvl="1"/>
-            <a:r>
-              <a:rPr lang="en-US" sz="1800" dirty="0" smtClean="0">
-                <a:latin typeface="Calibri" pitchFamily="34" charset="0"/>
-                <a:cs typeface="Calibri" pitchFamily="34" charset="0"/>
-              </a:rPr>
-              <a:t>One or more layers of utility APIs (routines, structures, variables, etc.) that connect the application to the LLD</a:t>
-            </a:r>
-          </a:p>
-          <a:p>
-            <a:r>
-              <a:rPr lang="en-US" sz="2400" dirty="0" smtClean="0">
-                <a:latin typeface="Calibri" pitchFamily="34" charset="0"/>
-                <a:cs typeface="Calibri" pitchFamily="34" charset="0"/>
-              </a:rPr>
-              <a:t>Code </a:t>
-            </a:r>
-            <a:r>
-              <a:rPr lang="en-US" sz="2400" dirty="0" smtClean="0"/>
-              <a:t>D</a:t>
-            </a:r>
-            <a:r>
-              <a:rPr lang="en-US" sz="2400" dirty="0" smtClean="0">
-                <a:latin typeface="Calibri" pitchFamily="34" charset="0"/>
-                <a:cs typeface="Calibri" pitchFamily="34" charset="0"/>
-              </a:rPr>
-              <a:t>evelopment </a:t>
-            </a:r>
-            <a:r>
-              <a:rPr lang="en-US" sz="2400" dirty="0" smtClean="0">
-                <a:latin typeface="Calibri" pitchFamily="34" charset="0"/>
-                <a:cs typeface="Calibri" pitchFamily="34" charset="0"/>
-              </a:rPr>
-              <a:t>Environment:</a:t>
+              <a:t>Application development ecosystem:</a:t>
             </a:r>
           </a:p>
           <a:p>
@@ -22319,180 +22094,6 @@
               </a:rPr>
               <a:t>Libraries (code, sub-routines, values, etc.)</a:t>
             </a:r>
-          </a:p>
-        </p:txBody>
-      </p:sp>
-      <p:sp>
-        <p:nvSpPr>
-          <p:cNvPr id="6" name="Rectangle 4"/>
-          <p:cNvSpPr>
-            <a:spLocks noChangeArrowheads="1"/>
-          </p:cNvSpPr>
-          <p:nvPr/>
-        </p:nvSpPr>
-        <p:spPr bwMode="auto">
-          <a:xfrm>
-            <a:off x="6781800" y="2362200"/>
-            <a:ext cx="1981200" cy="381000"/>
-          </a:xfrm>
-          <a:prstGeom prst="rect">
-            <a:avLst/>
-          </a:prstGeom>
-          <a:solidFill>
-            <a:srgbClr val="E6B9B8"/>
-          </a:solidFill>
-          <a:ln w="9525">
-            <a:solidFill>
-              <a:schemeClr val="tx1"/>
-            </a:solidFill>
-            <a:miter lim="800000"/>
-            <a:headEnd/>
-            <a:tailEnd/>
-          </a:ln>
-          <a:effectLst/>
-        </p:spPr>
-        <p:txBody>
-          <a:bodyPr wrap="none" anchor="ctr"/>
-          <a:lstStyle/>
-          <a:p>
-            <a:pPr algn="ctr">
-              <a:defRPr/>
-            </a:pPr>
-            <a:r>
-              <a:rPr lang="en-US" sz="1200" b="1" dirty="0"/>
-              <a:t>Hardware</a:t>
-            </a:r>
-          </a:p>
-        </p:txBody>
-      </p:sp>
-      <p:sp>
-        <p:nvSpPr>
-          <p:cNvPr id="7" name="Rectangle 7"/>
-          <p:cNvSpPr>
-            <a:spLocks noChangeArrowheads="1"/>
-          </p:cNvSpPr>
-          <p:nvPr/>
-        </p:nvSpPr>
-        <p:spPr bwMode="auto">
-          <a:xfrm>
-            <a:off x="6781800" y="1371600"/>
-            <a:ext cx="1981200" cy="457200"/>
-          </a:xfrm>
-          <a:prstGeom prst="rect">
-            <a:avLst/>
-          </a:prstGeom>
-          <a:solidFill>
-            <a:srgbClr val="FFFFCC"/>
-          </a:solidFill>
-          <a:ln w="9525">
-            <a:solidFill>
-              <a:schemeClr val="tx1"/>
-            </a:solidFill>
-            <a:miter lim="800000"/>
-            <a:headEnd/>
-            <a:tailEnd/>
-          </a:ln>
-        </p:spPr>
-        <p:txBody>
-          <a:bodyPr wrap="none" anchor="ctr"/>
-          <a:lstStyle/>
-          <a:p>
-            <a:pPr algn="ctr"/>
-            <a:r>
-              <a:rPr lang="en-US" sz="1200" b="1" dirty="0" smtClean="0"/>
-              <a:t>Operating System</a:t>
-            </a:r>
-            <a:endParaRPr lang="en-US" sz="1200" b="1" dirty="0"/>
-          </a:p>
-        </p:txBody>
-      </p:sp>
-      <p:sp>
-        <p:nvSpPr>
-          <p:cNvPr id="9" name="Rectangle 13"/>
-          <p:cNvSpPr>
-            <a:spLocks noChangeArrowheads="1"/>
-          </p:cNvSpPr>
-          <p:nvPr/>
-        </p:nvSpPr>
-        <p:spPr bwMode="auto">
-          <a:xfrm>
-            <a:off x="6781800" y="914400"/>
-            <a:ext cx="1981200" cy="381000"/>
-          </a:xfrm>
-          <a:prstGeom prst="rect">
-            <a:avLst/>
-          </a:prstGeom>
-          <a:solidFill>
-            <a:schemeClr val="bg1">
-              <a:lumMod val="85000"/>
-            </a:schemeClr>
-          </a:solidFill>
-          <a:ln w="9525">
-            <a:solidFill>
-              <a:schemeClr val="tx1"/>
-            </a:solidFill>
-            <a:miter lim="800000"/>
-            <a:headEnd/>
-            <a:tailEnd/>
-          </a:ln>
-          <a:effectLst/>
-        </p:spPr>
-        <p:txBody>
-          <a:bodyPr wrap="none"/>
-          <a:lstStyle/>
-          <a:p>
-            <a:pPr algn="ctr">
-              <a:defRPr/>
-            </a:pPr>
-            <a:r>
-              <a:rPr lang="en-US" sz="1200" b="1" dirty="0" smtClean="0"/>
-              <a:t>Applications</a:t>
-            </a:r>
-            <a:endParaRPr lang="en-US" sz="1200" dirty="0"/>
-          </a:p>
-        </p:txBody>
-      </p:sp>
-      <p:sp>
-        <p:nvSpPr>
-          <p:cNvPr id="8" name="Rectangle 5"/>
-          <p:cNvSpPr>
-            <a:spLocks noChangeArrowheads="1"/>
-          </p:cNvSpPr>
-          <p:nvPr/>
-        </p:nvSpPr>
-        <p:spPr bwMode="auto">
-          <a:xfrm>
-            <a:off x="6781800" y="1905000"/>
-            <a:ext cx="1995487" cy="381000"/>
-          </a:xfrm>
-          <a:prstGeom prst="rect">
-            <a:avLst/>
-          </a:prstGeom>
-          <a:solidFill>
-            <a:srgbClr val="D7E4BD"/>
-          </a:solidFill>
-          <a:ln w="9525">
-            <a:solidFill>
-              <a:schemeClr val="tx1"/>
-            </a:solidFill>
-            <a:miter lim="800000"/>
-            <a:headEnd/>
-            <a:tailEnd/>
-          </a:ln>
-          <a:effectLst/>
-        </p:spPr>
-        <p:txBody>
-          <a:bodyPr wrap="none" anchor="ctr"/>
-          <a:lstStyle/>
-          <a:p>
-            <a:pPr algn="ctr">
-              <a:defRPr/>
-            </a:pPr>
-            <a:r>
-              <a:rPr lang="en-US" sz="1200" b="1" dirty="0" smtClean="0"/>
-              <a:t>API + LLD</a:t>
-            </a:r>
-            <a:endParaRPr lang="en-US" sz="1200" b="1" dirty="0"/>
           </a:p>
         </p:txBody>
       </p:sp>
@@ -22546,13 +22147,13 @@
         </p:spPr>
         <p:txBody>
           <a:bodyPr>
-            <a:normAutofit fontScale="90000"/>
+            <a:normAutofit/>
           </a:bodyPr>
           <a:lstStyle/>
           <a:p>
             <a:r>
-              <a:rPr lang="en-US" dirty="0" smtClean="0"/>
-              <a:t>Traditional TI DSP Software Support</a:t>
+              <a:rPr lang="en-US" sz="3600" dirty="0" smtClean="0"/>
+              <a:t>TI DSP Software Support</a:t>
             </a:r>
             <a:endParaRPr lang="en-US" sz="3600" dirty="0"/>
           </a:p>
@@ -22649,29 +22250,21 @@
           <a:p>
             <a:pPr lvl="1"/>
             <a:r>
-              <a:rPr lang="en-US" dirty="0" smtClean="0"/>
+              <a:rPr lang="en-US" sz="2400" dirty="0" smtClean="0"/>
               <a:t>Code Composer Studio (CCS)</a:t>
             </a:r>
           </a:p>
           <a:p>
             <a:pPr lvl="1"/>
             <a:r>
-              <a:rPr lang="en-US" dirty="0" smtClean="0"/>
-              <a:t>Code Generation (</a:t>
-            </a:r>
-            <a:r>
-              <a:rPr lang="en-US" dirty="0" err="1" smtClean="0"/>
-              <a:t>CodeGen</a:t>
-            </a:r>
-            <a:r>
-              <a:rPr lang="en-US" dirty="0" smtClean="0"/>
-              <a:t>)</a:t>
+              <a:rPr lang="en-US" sz="2400" dirty="0" smtClean="0"/>
+              <a:t>Code Generation (CodeGen)</a:t>
             </a:r>
           </a:p>
           <a:p>
             <a:pPr lvl="1"/>
             <a:r>
-              <a:rPr lang="en-US" dirty="0" smtClean="0"/>
+              <a:rPr lang="en-US" sz="2400" dirty="0" smtClean="0"/>
               <a:t>Debug, emulation, monitoring, profiling</a:t>
             </a:r>
           </a:p>
@@ -22741,11 +22334,7 @@
           <a:p>
             <a:r>
               <a:rPr lang="en-US" sz="3600" dirty="0" smtClean="0"/>
-              <a:t>Developing on KeyStone </a:t>
-            </a:r>
-            <a:r>
-              <a:rPr lang="en-US" sz="3600" dirty="0" err="1" smtClean="0"/>
-              <a:t>SoC</a:t>
+              <a:t>KeyStone Advantages &amp; Requirements</a:t>
             </a:r>
             <a:endParaRPr lang="en-US" sz="3600" dirty="0"/>
           </a:p>
@@ -22763,68 +22352,64 @@
         </p:nvSpPr>
         <p:spPr>
           <a:xfrm>
-            <a:off x="457200" y="1066800"/>
-            <a:ext cx="8229600" cy="4525963"/>
+            <a:off x="457200" y="1143000"/>
+            <a:ext cx="8229600" cy="5029200"/>
           </a:xfrm>
         </p:spPr>
         <p:txBody>
           <a:bodyPr>
-            <a:normAutofit/>
+            <a:noAutofit/>
           </a:bodyPr>
           <a:lstStyle/>
           <a:p>
             <a:r>
               <a:rPr lang="en-US" sz="2400" dirty="0" smtClean="0"/>
-              <a:t> TI’s KeyStone </a:t>
-            </a:r>
-            <a:r>
-              <a:rPr lang="en-US" sz="2400" dirty="0" err="1" smtClean="0"/>
-              <a:t>SoC</a:t>
-            </a:r>
+              <a:t>KeyStone SoC devices offer many advantages:</a:t>
+            </a:r>
+          </a:p>
+          <a:p>
+            <a:pPr lvl="1"/>
             <a:r>
               <a:rPr lang="en-US" sz="2400" dirty="0" smtClean="0"/>
-              <a:t> devices offer many advantages:</a:t>
+              <a:t>Multiple cores</a:t>
             </a:r>
           </a:p>
           <a:p>
             <a:pPr lvl="1"/>
             <a:r>
-              <a:rPr lang="en-US" sz="2000" dirty="0" smtClean="0"/>
-              <a:t>Multicores</a:t>
+              <a:rPr lang="en-US" sz="2400" dirty="0" smtClean="0"/>
+              <a:t>Advanced core performance</a:t>
             </a:r>
           </a:p>
           <a:p>
             <a:pPr lvl="1"/>
             <a:r>
-              <a:rPr lang="en-US" sz="2000" dirty="0" smtClean="0"/>
-              <a:t>Advanced core performance</a:t>
+              <a:rPr lang="en-US" sz="2400" dirty="0" smtClean="0"/>
+              <a:t>Distributed memory architecture</a:t>
             </a:r>
           </a:p>
           <a:p>
             <a:pPr lvl="1"/>
             <a:r>
-              <a:rPr lang="en-US" sz="2000" dirty="0" smtClean="0"/>
-              <a:t>Distributed memory architecture</a:t>
+              <a:rPr lang="en-US" sz="2400" dirty="0" smtClean="0"/>
+              <a:t>Multiple peripherals and co-processors</a:t>
             </a:r>
           </a:p>
           <a:p>
             <a:pPr lvl="1"/>
             <a:r>
-              <a:rPr lang="en-US" sz="2000" dirty="0" smtClean="0"/>
-              <a:t>Multiple peripherals and co-processors</a:t>
-            </a:r>
-          </a:p>
-          <a:p>
-            <a:pPr lvl="1"/>
-            <a:r>
-              <a:rPr lang="en-US" sz="2000" dirty="0" smtClean="0"/>
+              <a:rPr lang="en-US" sz="2400" dirty="0" smtClean="0"/>
               <a:t>High-speed transport mechanisms</a:t>
             </a:r>
-          </a:p>
-          <a:p>
-            <a:r>
+            <a:br>
               <a:rPr lang="en-US" sz="2400" dirty="0" smtClean="0"/>
-              <a:t>The challenge: </a:t>
+            </a:br>
+            <a:endParaRPr lang="en-US" sz="2400" dirty="0" smtClean="0"/>
+          </a:p>
+          <a:p>
+            <a:r>
+              <a:rPr lang="en-US" sz="2400" dirty="0" smtClean="0"/>
+              <a:t>Challenge: </a:t>
             </a:r>
             <a:r>
               <a:rPr lang="en-US" sz="2400" dirty="0" smtClean="0">
@@ -22834,12 +22419,32 @@
               </a:rPr>
               <a:t>How to simplify programming and development of optimized applications on KeyStone devices?</a:t>
             </a:r>
-          </a:p>
-          <a:p>
-            <a:pPr>
-              <a:buNone/>
-            </a:pPr>
-            <a:endParaRPr lang="en-US" sz="2000" dirty="0" smtClean="0"/>
+            <a:br>
+              <a:rPr lang="en-US" sz="2400" dirty="0" smtClean="0">
+                <a:solidFill>
+                  <a:srgbClr val="0070C0"/>
+                </a:solidFill>
+              </a:rPr>
+            </a:br>
+            <a:endParaRPr lang="en-US" sz="2400" dirty="0" smtClean="0">
+              <a:solidFill>
+                <a:srgbClr val="0070C0"/>
+              </a:solidFill>
+            </a:endParaRPr>
+          </a:p>
+          <a:p>
+            <a:r>
+              <a:rPr lang="en-US" sz="2400" dirty="0" smtClean="0"/>
+              <a:t>Solution: A fully integrated software development ecosystem built upon the </a:t>
+            </a:r>
+            <a:r>
+              <a:rPr lang="en-US" sz="2400" dirty="0" smtClean="0">
+                <a:solidFill>
+                  <a:srgbClr val="FF0000"/>
+                </a:solidFill>
+              </a:rPr>
+              <a:t>Multicore Software Development Kit (MCSDK)</a:t>
+            </a:r>
           </a:p>
         </p:txBody>
       </p:sp>
@@ -23635,42 +23240,26 @@
                 <a:ea typeface="ＭＳ Ｐゴシック" pitchFamily="34" charset="-128"/>
                 <a:cs typeface="Arial" charset="0"/>
               </a:rPr>
-              <a:t>Multicore </a:t>
-            </a:r>
+              <a:t>Multicore Software</a:t>
+            </a:r>
+          </a:p>
+          <a:p>
+            <a:pPr algn="ctr" fontAlgn="base">
+              <a:spcBef>
+                <a:spcPct val="0"/>
+              </a:spcBef>
+              <a:spcAft>
+                <a:spcPct val="0"/>
+              </a:spcAft>
+              <a:defRPr/>
+            </a:pPr>
             <a:r>
               <a:rPr lang="en-US" sz="1600" b="1" dirty="0" smtClean="0">
                 <a:latin typeface="Arial" pitchFamily="34" charset="0"/>
                 <a:ea typeface="ＭＳ Ｐゴシック" pitchFamily="34" charset="-128"/>
                 <a:cs typeface="Arial" charset="0"/>
               </a:rPr>
-              <a:t>Software</a:t>
-            </a:r>
-          </a:p>
-          <a:p>
-            <a:pPr algn="ctr" fontAlgn="base">
-              <a:spcBef>
-                <a:spcPct val="0"/>
-              </a:spcBef>
-              <a:spcAft>
-                <a:spcPct val="0"/>
-              </a:spcAft>
-              <a:defRPr/>
-            </a:pPr>
-            <a:r>
-              <a:rPr lang="en-US" sz="1600" b="1" dirty="0" smtClean="0">
-                <a:latin typeface="Arial" pitchFamily="34" charset="0"/>
-                <a:ea typeface="ＭＳ Ｐゴシック" pitchFamily="34" charset="-128"/>
-                <a:cs typeface="Arial" charset="0"/>
-              </a:rPr>
-              <a:t>Development </a:t>
-            </a:r>
-            <a:r>
-              <a:rPr lang="en-US" sz="1600" b="1" dirty="0" smtClean="0">
-                <a:latin typeface="Arial" pitchFamily="34" charset="0"/>
-                <a:ea typeface="ＭＳ Ｐゴシック" pitchFamily="34" charset="-128"/>
-                <a:cs typeface="Arial" charset="0"/>
-              </a:rPr>
-              <a:t>Kit</a:t>
+              <a:t>Development Kit</a:t>
             </a:r>
           </a:p>
           <a:p>
@@ -23934,18 +23523,14 @@
           <a:p>
             <a:pPr eaLnBrk="1" hangingPunct="1"/>
             <a:r>
-              <a:rPr lang="en-US" sz="3200" b="1" dirty="0" smtClean="0"/>
+              <a:rPr lang="en-US" sz="3600" dirty="0" smtClean="0"/>
               <a:t>TI Software Development Ecosystem</a:t>
             </a:r>
-            <a:r>
-              <a:rPr lang="en-US" b="1" dirty="0" smtClean="0"/>
-              <a:t/>
-            </a:r>
             <a:br>
-              <a:rPr lang="en-US" b="1" dirty="0" smtClean="0"/>
+              <a:rPr lang="en-US" sz="3600" dirty="0" smtClean="0"/>
             </a:br>
             <a:r>
-              <a:rPr lang="en-US" sz="2400" b="1" dirty="0" smtClean="0"/>
+              <a:rPr lang="en-US" sz="2400" dirty="0" smtClean="0"/>
               <a:t>Multicore Performance, Single-core Simplicity</a:t>
             </a:r>
           </a:p>
@@ -24798,42 +24383,26 @@
                 <a:ea typeface="ＭＳ Ｐゴシック" pitchFamily="34" charset="-128"/>
                 <a:cs typeface="Arial" charset="0"/>
               </a:rPr>
-              <a:t>Multicore </a:t>
-            </a:r>
+              <a:t>Multicore Software</a:t>
+            </a:r>
+          </a:p>
+          <a:p>
+            <a:pPr algn="ctr" fontAlgn="base">
+              <a:spcBef>
+                <a:spcPct val="0"/>
+              </a:spcBef>
+              <a:spcAft>
+                <a:spcPct val="0"/>
+              </a:spcAft>
+              <a:defRPr/>
+            </a:pPr>
             <a:r>
               <a:rPr lang="en-US" sz="1600" b="1" dirty="0" smtClean="0">
                 <a:latin typeface="Arial" pitchFamily="34" charset="0"/>
                 <a:ea typeface="ＭＳ Ｐゴシック" pitchFamily="34" charset="-128"/>
                 <a:cs typeface="Arial" charset="0"/>
               </a:rPr>
-              <a:t>Software</a:t>
-            </a:r>
-          </a:p>
-          <a:p>
-            <a:pPr algn="ctr" fontAlgn="base">
-              <a:spcBef>
-                <a:spcPct val="0"/>
-              </a:spcBef>
-              <a:spcAft>
-                <a:spcPct val="0"/>
-              </a:spcAft>
-              <a:defRPr/>
-            </a:pPr>
-            <a:r>
-              <a:rPr lang="en-US" sz="1600" b="1" dirty="0" smtClean="0">
-                <a:latin typeface="Arial" pitchFamily="34" charset="0"/>
-                <a:ea typeface="ＭＳ Ｐゴシック" pitchFamily="34" charset="-128"/>
-                <a:cs typeface="Arial" charset="0"/>
-              </a:rPr>
-              <a:t>Development </a:t>
-            </a:r>
-            <a:r>
-              <a:rPr lang="en-US" sz="1600" b="1" dirty="0" smtClean="0">
-                <a:latin typeface="Arial" pitchFamily="34" charset="0"/>
-                <a:ea typeface="ＭＳ Ｐゴシック" pitchFamily="34" charset="-128"/>
-                <a:cs typeface="Arial" charset="0"/>
-              </a:rPr>
-              <a:t>Kit</a:t>
+              <a:t>Development Kit</a:t>
             </a:r>
           </a:p>
           <a:p>
@@ -25097,19 +24666,15 @@
           <a:p>
             <a:pPr eaLnBrk="1" hangingPunct="1"/>
             <a:r>
-              <a:rPr lang="en-US" sz="3200" b="1" dirty="0" smtClean="0"/>
+              <a:rPr lang="en-US" sz="3600" dirty="0" smtClean="0"/>
               <a:t>TI Software Development Ecosystem</a:t>
             </a:r>
-            <a:r>
-              <a:rPr lang="en-US" b="1" dirty="0" smtClean="0"/>
-              <a:t/>
-            </a:r>
             <a:br>
-              <a:rPr lang="en-US" b="1" dirty="0" smtClean="0"/>
+              <a:rPr lang="en-US" sz="3600" dirty="0" smtClean="0"/>
             </a:br>
             <a:r>
-              <a:rPr lang="en-US" sz="2400" b="1" dirty="0" smtClean="0"/>
-              <a:t>Multicore Performance, Single-core Simplicity</a:t>
+              <a:rPr lang="en-US" sz="2400" dirty="0" smtClean="0"/>
+              <a:t>Code Composer Studio + Eclipse IDE</a:t>
             </a:r>
           </a:p>
         </p:txBody>
@@ -26125,42 +25690,26 @@
                 <a:ea typeface="ＭＳ Ｐゴシック" pitchFamily="34" charset="-128"/>
                 <a:cs typeface="Arial" charset="0"/>
               </a:rPr>
-              <a:t>Multicore </a:t>
-            </a:r>
+              <a:t>Multicore Software</a:t>
+            </a:r>
+          </a:p>
+          <a:p>
+            <a:pPr algn="ctr" fontAlgn="base">
+              <a:spcBef>
+                <a:spcPct val="0"/>
+              </a:spcBef>
+              <a:spcAft>
+                <a:spcPct val="0"/>
+              </a:spcAft>
+              <a:defRPr/>
+            </a:pPr>
             <a:r>
               <a:rPr lang="en-US" sz="1600" b="1" dirty="0" smtClean="0">
                 <a:latin typeface="Arial" pitchFamily="34" charset="0"/>
                 <a:ea typeface="ＭＳ Ｐゴシック" pitchFamily="34" charset="-128"/>
                 <a:cs typeface="Arial" charset="0"/>
               </a:rPr>
-              <a:t>Software</a:t>
-            </a:r>
-          </a:p>
-          <a:p>
-            <a:pPr algn="ctr" fontAlgn="base">
-              <a:spcBef>
-                <a:spcPct val="0"/>
-              </a:spcBef>
-              <a:spcAft>
-                <a:spcPct val="0"/>
-              </a:spcAft>
-              <a:defRPr/>
-            </a:pPr>
-            <a:r>
-              <a:rPr lang="en-US" sz="1600" b="1" dirty="0" smtClean="0">
-                <a:latin typeface="Arial" pitchFamily="34" charset="0"/>
-                <a:ea typeface="ＭＳ Ｐゴシック" pitchFamily="34" charset="-128"/>
-                <a:cs typeface="Arial" charset="0"/>
-              </a:rPr>
-              <a:t>Development </a:t>
-            </a:r>
-            <a:r>
-              <a:rPr lang="en-US" sz="1600" b="1" dirty="0" smtClean="0">
-                <a:latin typeface="Arial" pitchFamily="34" charset="0"/>
-                <a:ea typeface="ＭＳ Ｐゴシック" pitchFamily="34" charset="-128"/>
-                <a:cs typeface="Arial" charset="0"/>
-              </a:rPr>
-              <a:t>Kit</a:t>
+              <a:t>Development Kit</a:t>
             </a:r>
           </a:p>
           <a:p>
@@ -26318,19 +25867,15 @@
           <a:p>
             <a:pPr eaLnBrk="1" hangingPunct="1"/>
             <a:r>
-              <a:rPr lang="en-US" sz="3200" b="1" dirty="0" smtClean="0"/>
+              <a:rPr lang="en-US" sz="3600" dirty="0" smtClean="0"/>
               <a:t>TI Software Development Ecosystem</a:t>
             </a:r>
-            <a:r>
-              <a:rPr lang="en-US" b="1" dirty="0" smtClean="0"/>
-              <a:t/>
-            </a:r>
             <a:br>
-              <a:rPr lang="en-US" b="1" dirty="0" smtClean="0"/>
+              <a:rPr lang="en-US" sz="3600" dirty="0" smtClean="0"/>
             </a:br>
             <a:r>
-              <a:rPr lang="en-US" sz="2400" b="1" dirty="0" smtClean="0"/>
-              <a:t>Multicore Performance, Single-core Simplicity</a:t>
+              <a:rPr lang="en-US" sz="2400" dirty="0" smtClean="0"/>
+              <a:t>Multicore Software Development Kit</a:t>
             </a:r>
           </a:p>
         </p:txBody>

</xml_diff>